<commit_message>
Set up for code and testing to ensure examples given are correct
</commit_message>
<xml_diff>
--- a/Dijkstra.pptx
+++ b/Dijkstra.pptx
@@ -5,13 +5,17 @@
     <p:sldMasterId id="2147483648" r:id="rId1"/>
   </p:sldMasterIdLst>
   <p:notesMasterIdLst>
-    <p:notesMasterId r:id="rId4"/>
+    <p:notesMasterId r:id="rId8"/>
   </p:notesMasterIdLst>
   <p:handoutMasterIdLst>
-    <p:handoutMasterId r:id="rId5"/>
+    <p:handoutMasterId r:id="rId9"/>
   </p:handoutMasterIdLst>
   <p:sldIdLst>
     <p:sldId id="256" r:id="rId3"/>
+    <p:sldId id="259" r:id="rId4"/>
+    <p:sldId id="257" r:id="rId5"/>
+    <p:sldId id="260" r:id="rId6"/>
+    <p:sldId id="262" r:id="rId7"/>
   </p:sldIdLst>
   <p:sldSz cx="12192000" cy="6858000"/>
   <p:notesSz cx="7103745" cy="10234295"/>
@@ -3552,11 +3556,4443 @@
           <a:chExt cx="0" cy="0"/>
         </a:xfrm>
       </p:grpSpPr>
+      <p:sp>
+        <p:nvSpPr>
+          <p:cNvPr id="3" name="Text Box 2"/>
+          <p:cNvSpPr txBox="1"/>
+          <p:nvPr/>
+        </p:nvSpPr>
+        <p:spPr>
+          <a:xfrm>
+            <a:off x="1880235" y="2326640"/>
+            <a:ext cx="8430895" cy="1383665"/>
+          </a:xfrm>
+          <a:prstGeom prst="rect">
+            <a:avLst/>
+          </a:prstGeom>
+          <a:noFill/>
+        </p:spPr>
+        <p:txBody>
+          <a:bodyPr wrap="square" rtlCol="0">
+            <a:spAutoFit/>
+          </a:bodyPr>
+          <a:p>
+            <a:pPr algn="ctr"/>
+            <a:r>
+              <a:rPr lang="en-US" sz="6000">
+                <a:solidFill>
+                  <a:schemeClr val="bg1"/>
+                </a:solidFill>
+              </a:rPr>
+              <a:t>DIJKSTRA’S ALGORITHM</a:t>
+            </a:r>
+            <a:endParaRPr lang="en-US" sz="6000">
+              <a:solidFill>
+                <a:schemeClr val="bg1"/>
+              </a:solidFill>
+            </a:endParaRPr>
+          </a:p>
+          <a:p>
+            <a:pPr algn="ctr"/>
+            <a:r>
+              <a:rPr lang="en-US" sz="2400">
+                <a:solidFill>
+                  <a:schemeClr val="bg1"/>
+                </a:solidFill>
+              </a:rPr>
+              <a:t>and it’s use in Google Maps</a:t>
+            </a:r>
+            <a:endParaRPr lang="en-US" sz="2400">
+              <a:solidFill>
+                <a:schemeClr val="bg1"/>
+              </a:solidFill>
+            </a:endParaRPr>
+          </a:p>
+        </p:txBody>
+      </p:sp>
     </p:spTree>
   </p:cSld>
   <p:clrMapOvr>
     <a:masterClrMapping/>
   </p:clrMapOvr>
+  <mc:AlternateContent xmlns:mc="http://schemas.openxmlformats.org/markup-compatibility/2006" xmlns:p159="http://schemas.microsoft.com/office/powerpoint/2015/09/main">
+    <mc:Choice Requires="p159">
+      <p:transition xmlns:p14="http://schemas.microsoft.com/office/powerpoint/2010/main" spd="slow" p14:dur="1000">
+        <p159:morph option="byObject"/>
+      </p:transition>
+    </mc:Choice>
+    <mc:Fallback>
+      <p:transition spd="slow">
+        <p:fade/>
+      </p:transition>
+    </mc:Fallback>
+  </mc:AlternateContent>
+</p:sld>
+</file>
+
+<file path=ppt/slides/slide2.xml><?xml version="1.0" encoding="utf-8"?>
+<p:sld xmlns:a="http://schemas.openxmlformats.org/drawingml/2006/main" xmlns:r="http://schemas.openxmlformats.org/officeDocument/2006/relationships" xmlns:p="http://schemas.openxmlformats.org/presentationml/2006/main">
+  <p:cSld>
+    <p:bg>
+      <p:bgPr>
+        <a:gradFill>
+          <a:gsLst>
+            <a:gs pos="0">
+              <a:srgbClr val="7B32B2"/>
+            </a:gs>
+            <a:gs pos="87000">
+              <a:srgbClr val="401A5D"/>
+            </a:gs>
+          </a:gsLst>
+          <a:lin ang="4560000" scaled="0"/>
+        </a:gradFill>
+        <a:effectLst/>
+      </p:bgPr>
+    </p:bg>
+    <p:spTree>
+      <p:nvGrpSpPr>
+        <p:cNvPr id="1" name=""/>
+        <p:cNvGrpSpPr/>
+        <p:nvPr/>
+      </p:nvGrpSpPr>
+      <p:grpSpPr>
+        <a:xfrm>
+          <a:off x="0" y="0"/>
+          <a:ext cx="0" cy="0"/>
+          <a:chOff x="0" y="0"/>
+          <a:chExt cx="0" cy="0"/>
+        </a:xfrm>
+      </p:grpSpPr>
+      <p:pic>
+        <p:nvPicPr>
+          <p:cNvPr id="6" name="Picture 5" descr="Screenshot 2023-12-10 at 10-58-56 Google Maps"/>
+          <p:cNvPicPr>
+            <a:picLocks noChangeAspect="1"/>
+          </p:cNvPicPr>
+          <p:nvPr/>
+        </p:nvPicPr>
+        <p:blipFill>
+          <a:blip r:embed="rId1"/>
+          <a:stretch>
+            <a:fillRect/>
+          </a:stretch>
+        </p:blipFill>
+        <p:spPr>
+          <a:xfrm>
+            <a:off x="2520315" y="1567180"/>
+            <a:ext cx="7151370" cy="4035425"/>
+          </a:xfrm>
+          <a:prstGeom prst="rect">
+            <a:avLst/>
+          </a:prstGeom>
+        </p:spPr>
+      </p:pic>
+      <p:sp>
+        <p:nvSpPr>
+          <p:cNvPr id="3" name="Text Box 2"/>
+          <p:cNvSpPr txBox="1"/>
+          <p:nvPr/>
+        </p:nvSpPr>
+        <p:spPr>
+          <a:xfrm>
+            <a:off x="1880235" y="118745"/>
+            <a:ext cx="8430895" cy="829945"/>
+          </a:xfrm>
+          <a:prstGeom prst="rect">
+            <a:avLst/>
+          </a:prstGeom>
+          <a:noFill/>
+        </p:spPr>
+        <p:txBody>
+          <a:bodyPr wrap="square" rtlCol="0">
+            <a:spAutoFit/>
+          </a:bodyPr>
+          <a:p>
+            <a:pPr algn="ctr"/>
+            <a:r>
+              <a:rPr lang="en-US" sz="3600">
+                <a:solidFill>
+                  <a:schemeClr val="bg1"/>
+                </a:solidFill>
+              </a:rPr>
+              <a:t>DIJKSTRA’S ALGORITHM</a:t>
+            </a:r>
+            <a:endParaRPr lang="en-US" sz="3600">
+              <a:solidFill>
+                <a:schemeClr val="bg1"/>
+              </a:solidFill>
+            </a:endParaRPr>
+          </a:p>
+          <a:p>
+            <a:pPr algn="ctr"/>
+            <a:r>
+              <a:rPr lang="en-US" sz="1200">
+                <a:solidFill>
+                  <a:schemeClr val="bg1"/>
+                </a:solidFill>
+              </a:rPr>
+              <a:t>and it’s use in Google Maps</a:t>
+            </a:r>
+            <a:endParaRPr lang="en-US" sz="1200">
+              <a:solidFill>
+                <a:schemeClr val="bg1"/>
+              </a:solidFill>
+            </a:endParaRPr>
+          </a:p>
+        </p:txBody>
+      </p:sp>
+      <p:sp>
+        <p:nvSpPr>
+          <p:cNvPr id="2" name="Down Arrow Callout 1"/>
+          <p:cNvSpPr/>
+          <p:nvPr/>
+        </p:nvSpPr>
+        <p:spPr>
+          <a:xfrm>
+            <a:off x="5711825" y="1927225"/>
+            <a:ext cx="989965" cy="615950"/>
+          </a:xfrm>
+          <a:prstGeom prst="downArrowCallout">
+            <a:avLst/>
+          </a:prstGeom>
+          <a:solidFill>
+            <a:schemeClr val="bg1"/>
+          </a:solidFill>
+        </p:spPr>
+        <p:style>
+          <a:lnRef idx="2">
+            <a:schemeClr val="accent1">
+              <a:shade val="50000"/>
+            </a:schemeClr>
+          </a:lnRef>
+          <a:fillRef idx="1">
+            <a:schemeClr val="accent1"/>
+          </a:fillRef>
+          <a:effectRef idx="0">
+            <a:schemeClr val="accent1"/>
+          </a:effectRef>
+          <a:fontRef idx="minor">
+            <a:schemeClr val="lt1"/>
+          </a:fontRef>
+        </p:style>
+        <p:txBody>
+          <a:bodyPr rtlCol="0" anchor="ctr"/>
+          <a:p>
+            <a:pPr algn="ctr"/>
+            <a:r>
+              <a:rPr lang="en-US">
+                <a:solidFill>
+                  <a:schemeClr val="tx1"/>
+                </a:solidFill>
+              </a:rPr>
+              <a:t>35.6KM</a:t>
+            </a:r>
+            <a:endParaRPr lang="en-US">
+              <a:solidFill>
+                <a:schemeClr val="tx1"/>
+              </a:solidFill>
+            </a:endParaRPr>
+          </a:p>
+        </p:txBody>
+      </p:sp>
+      <p:sp>
+        <p:nvSpPr>
+          <p:cNvPr id="4" name="Down Arrow Callout 3"/>
+          <p:cNvSpPr/>
+          <p:nvPr/>
+        </p:nvSpPr>
+        <p:spPr>
+          <a:xfrm>
+            <a:off x="5349875" y="2771775"/>
+            <a:ext cx="989965" cy="615950"/>
+          </a:xfrm>
+          <a:prstGeom prst="downArrowCallout">
+            <a:avLst/>
+          </a:prstGeom>
+          <a:solidFill>
+            <a:schemeClr val="bg1"/>
+          </a:solidFill>
+        </p:spPr>
+        <p:style>
+          <a:lnRef idx="2">
+            <a:schemeClr val="accent1">
+              <a:shade val="50000"/>
+            </a:schemeClr>
+          </a:lnRef>
+          <a:fillRef idx="1">
+            <a:schemeClr val="accent1"/>
+          </a:fillRef>
+          <a:effectRef idx="0">
+            <a:schemeClr val="accent1"/>
+          </a:effectRef>
+          <a:fontRef idx="minor">
+            <a:schemeClr val="lt1"/>
+          </a:fontRef>
+        </p:style>
+        <p:txBody>
+          <a:bodyPr rtlCol="0" anchor="ctr"/>
+          <a:p>
+            <a:pPr algn="ctr"/>
+            <a:r>
+              <a:rPr lang="en-US">
+                <a:solidFill>
+                  <a:schemeClr val="tx1"/>
+                </a:solidFill>
+              </a:rPr>
+              <a:t>37.6KM</a:t>
+            </a:r>
+            <a:endParaRPr lang="en-US">
+              <a:solidFill>
+                <a:schemeClr val="tx1"/>
+              </a:solidFill>
+            </a:endParaRPr>
+          </a:p>
+        </p:txBody>
+      </p:sp>
+      <p:sp>
+        <p:nvSpPr>
+          <p:cNvPr id="5" name="Down Arrow Callout 4"/>
+          <p:cNvSpPr/>
+          <p:nvPr/>
+        </p:nvSpPr>
+        <p:spPr>
+          <a:xfrm>
+            <a:off x="5330825" y="3400425"/>
+            <a:ext cx="989965" cy="615950"/>
+          </a:xfrm>
+          <a:prstGeom prst="downArrowCallout">
+            <a:avLst/>
+          </a:prstGeom>
+          <a:solidFill>
+            <a:schemeClr val="bg1"/>
+          </a:solidFill>
+        </p:spPr>
+        <p:style>
+          <a:lnRef idx="2">
+            <a:schemeClr val="accent1">
+              <a:shade val="50000"/>
+            </a:schemeClr>
+          </a:lnRef>
+          <a:fillRef idx="1">
+            <a:schemeClr val="accent1"/>
+          </a:fillRef>
+          <a:effectRef idx="0">
+            <a:schemeClr val="accent1"/>
+          </a:effectRef>
+          <a:fontRef idx="minor">
+            <a:schemeClr val="lt1"/>
+          </a:fontRef>
+        </p:style>
+        <p:txBody>
+          <a:bodyPr rtlCol="0" anchor="ctr"/>
+          <a:p>
+            <a:pPr algn="ctr"/>
+            <a:r>
+              <a:rPr lang="en-US">
+                <a:solidFill>
+                  <a:schemeClr val="tx1"/>
+                </a:solidFill>
+              </a:rPr>
+              <a:t>37.7KM</a:t>
+            </a:r>
+            <a:endParaRPr lang="en-US">
+              <a:solidFill>
+                <a:schemeClr val="tx1"/>
+              </a:solidFill>
+            </a:endParaRPr>
+          </a:p>
+        </p:txBody>
+      </p:sp>
+    </p:spTree>
+  </p:cSld>
+  <p:clrMapOvr>
+    <a:masterClrMapping/>
+  </p:clrMapOvr>
+  <mc:AlternateContent xmlns:mc="http://schemas.openxmlformats.org/markup-compatibility/2006" xmlns:p159="http://schemas.microsoft.com/office/powerpoint/2015/09/main">
+    <mc:Choice Requires="p159">
+      <p:transition xmlns:p14="http://schemas.microsoft.com/office/powerpoint/2010/main" spd="slow" p14:dur="1000">
+        <p159:morph option="byObject"/>
+      </p:transition>
+    </mc:Choice>
+    <mc:Fallback>
+      <p:transition spd="slow">
+        <p:fade/>
+      </p:transition>
+    </mc:Fallback>
+  </mc:AlternateContent>
+</p:sld>
+</file>
+
+<file path=ppt/slides/slide3.xml><?xml version="1.0" encoding="utf-8"?>
+<p:sld xmlns:a="http://schemas.openxmlformats.org/drawingml/2006/main" xmlns:r="http://schemas.openxmlformats.org/officeDocument/2006/relationships" xmlns:p="http://schemas.openxmlformats.org/presentationml/2006/main">
+  <p:cSld>
+    <p:bg>
+      <p:bgPr>
+        <a:gradFill>
+          <a:gsLst>
+            <a:gs pos="0">
+              <a:srgbClr val="7B32B2"/>
+            </a:gs>
+            <a:gs pos="87000">
+              <a:srgbClr val="401A5D"/>
+            </a:gs>
+          </a:gsLst>
+          <a:lin ang="4560000" scaled="0"/>
+        </a:gradFill>
+        <a:effectLst/>
+      </p:bgPr>
+    </p:bg>
+    <p:spTree>
+      <p:nvGrpSpPr>
+        <p:cNvPr id="1" name=""/>
+        <p:cNvGrpSpPr/>
+        <p:nvPr/>
+      </p:nvGrpSpPr>
+      <p:grpSpPr>
+        <a:xfrm>
+          <a:off x="0" y="0"/>
+          <a:ext cx="0" cy="0"/>
+          <a:chOff x="0" y="0"/>
+          <a:chExt cx="0" cy="0"/>
+        </a:xfrm>
+      </p:grpSpPr>
+      <p:pic>
+        <p:nvPicPr>
+          <p:cNvPr id="6" name="Picture 5" descr="Screenshot 2023-12-10 at 10-58-56 Google Maps"/>
+          <p:cNvPicPr>
+            <a:picLocks noChangeAspect="1"/>
+          </p:cNvPicPr>
+          <p:nvPr/>
+        </p:nvPicPr>
+        <p:blipFill>
+          <a:blip r:embed="rId1"/>
+          <a:stretch>
+            <a:fillRect/>
+          </a:stretch>
+        </p:blipFill>
+        <p:spPr>
+          <a:xfrm>
+            <a:off x="2520315" y="1567180"/>
+            <a:ext cx="7151370" cy="4035425"/>
+          </a:xfrm>
+          <a:prstGeom prst="rect">
+            <a:avLst/>
+          </a:prstGeom>
+        </p:spPr>
+      </p:pic>
+      <p:sp>
+        <p:nvSpPr>
+          <p:cNvPr id="3" name="Text Box 2"/>
+          <p:cNvSpPr txBox="1"/>
+          <p:nvPr/>
+        </p:nvSpPr>
+        <p:spPr>
+          <a:xfrm>
+            <a:off x="1880235" y="118745"/>
+            <a:ext cx="8430895" cy="829945"/>
+          </a:xfrm>
+          <a:prstGeom prst="rect">
+            <a:avLst/>
+          </a:prstGeom>
+          <a:noFill/>
+        </p:spPr>
+        <p:txBody>
+          <a:bodyPr wrap="square" rtlCol="0">
+            <a:spAutoFit/>
+          </a:bodyPr>
+          <a:p>
+            <a:pPr algn="ctr"/>
+            <a:r>
+              <a:rPr lang="en-US" sz="3600">
+                <a:solidFill>
+                  <a:schemeClr val="bg1"/>
+                </a:solidFill>
+              </a:rPr>
+              <a:t>DIJKSTRA’S ALGORITHM</a:t>
+            </a:r>
+            <a:endParaRPr lang="en-US" sz="3600">
+              <a:solidFill>
+                <a:schemeClr val="bg1"/>
+              </a:solidFill>
+            </a:endParaRPr>
+          </a:p>
+          <a:p>
+            <a:pPr algn="ctr"/>
+            <a:r>
+              <a:rPr lang="en-US" sz="1200">
+                <a:solidFill>
+                  <a:schemeClr val="bg1"/>
+                </a:solidFill>
+              </a:rPr>
+              <a:t>and it’s use in Google Maps</a:t>
+            </a:r>
+            <a:endParaRPr lang="en-US" sz="1200">
+              <a:solidFill>
+                <a:schemeClr val="bg1"/>
+              </a:solidFill>
+            </a:endParaRPr>
+          </a:p>
+        </p:txBody>
+      </p:sp>
+      <p:sp>
+        <p:nvSpPr>
+          <p:cNvPr id="2" name="Oval 1"/>
+          <p:cNvSpPr/>
+          <p:nvPr/>
+        </p:nvSpPr>
+        <p:spPr>
+          <a:xfrm>
+            <a:off x="3876675" y="3263265"/>
+            <a:ext cx="330835" cy="330835"/>
+          </a:xfrm>
+          <a:prstGeom prst="ellipse">
+            <a:avLst/>
+          </a:prstGeom>
+        </p:spPr>
+        <p:style>
+          <a:lnRef idx="2">
+            <a:schemeClr val="accent4">
+              <a:shade val="50000"/>
+            </a:schemeClr>
+          </a:lnRef>
+          <a:fillRef idx="1">
+            <a:schemeClr val="accent4"/>
+          </a:fillRef>
+          <a:effectRef idx="0">
+            <a:schemeClr val="accent4"/>
+          </a:effectRef>
+          <a:fontRef idx="minor">
+            <a:schemeClr val="lt1"/>
+          </a:fontRef>
+        </p:style>
+        <p:txBody>
+          <a:bodyPr rtlCol="0" anchor="ctr"/>
+          <a:p>
+            <a:pPr algn="ctr"/>
+            <a:r>
+              <a:rPr lang="en-US"/>
+              <a:t>E</a:t>
+            </a:r>
+            <a:endParaRPr lang="en-US"/>
+          </a:p>
+        </p:txBody>
+      </p:sp>
+      <p:sp>
+        <p:nvSpPr>
+          <p:cNvPr id="4" name="Oval 3"/>
+          <p:cNvSpPr/>
+          <p:nvPr/>
+        </p:nvSpPr>
+        <p:spPr>
+          <a:xfrm>
+            <a:off x="7839075" y="3155315"/>
+            <a:ext cx="330835" cy="330835"/>
+          </a:xfrm>
+          <a:prstGeom prst="ellipse">
+            <a:avLst/>
+          </a:prstGeom>
+        </p:spPr>
+        <p:style>
+          <a:lnRef idx="2">
+            <a:schemeClr val="accent4">
+              <a:shade val="50000"/>
+            </a:schemeClr>
+          </a:lnRef>
+          <a:fillRef idx="1">
+            <a:schemeClr val="accent4"/>
+          </a:fillRef>
+          <a:effectRef idx="0">
+            <a:schemeClr val="accent4"/>
+          </a:effectRef>
+          <a:fontRef idx="minor">
+            <a:schemeClr val="lt1"/>
+          </a:fontRef>
+        </p:style>
+        <p:txBody>
+          <a:bodyPr rtlCol="0" anchor="ctr"/>
+          <a:p>
+            <a:pPr algn="ctr"/>
+            <a:r>
+              <a:rPr lang="en-US"/>
+              <a:t>S</a:t>
+            </a:r>
+            <a:endParaRPr lang="en-US"/>
+          </a:p>
+        </p:txBody>
+      </p:sp>
+      <p:sp>
+        <p:nvSpPr>
+          <p:cNvPr id="5" name="Oval 4"/>
+          <p:cNvSpPr/>
+          <p:nvPr/>
+        </p:nvSpPr>
+        <p:spPr>
+          <a:xfrm>
+            <a:off x="7312025" y="2932430"/>
+            <a:ext cx="330835" cy="330835"/>
+          </a:xfrm>
+          <a:prstGeom prst="ellipse">
+            <a:avLst/>
+          </a:prstGeom>
+        </p:spPr>
+        <p:style>
+          <a:lnRef idx="2">
+            <a:schemeClr val="accent4">
+              <a:shade val="50000"/>
+            </a:schemeClr>
+          </a:lnRef>
+          <a:fillRef idx="1">
+            <a:schemeClr val="accent4"/>
+          </a:fillRef>
+          <a:effectRef idx="0">
+            <a:schemeClr val="accent4"/>
+          </a:effectRef>
+          <a:fontRef idx="minor">
+            <a:schemeClr val="lt1"/>
+          </a:fontRef>
+        </p:style>
+        <p:txBody>
+          <a:bodyPr rtlCol="0" anchor="ctr"/>
+          <a:p>
+            <a:pPr algn="ctr"/>
+            <a:r>
+              <a:rPr lang="en-US"/>
+              <a:t>A</a:t>
+            </a:r>
+            <a:endParaRPr lang="en-US"/>
+          </a:p>
+        </p:txBody>
+      </p:sp>
+      <p:sp>
+        <p:nvSpPr>
+          <p:cNvPr id="7" name="Oval 6"/>
+          <p:cNvSpPr/>
+          <p:nvPr/>
+        </p:nvSpPr>
+        <p:spPr>
+          <a:xfrm>
+            <a:off x="6200775" y="2487930"/>
+            <a:ext cx="330835" cy="330835"/>
+          </a:xfrm>
+          <a:prstGeom prst="ellipse">
+            <a:avLst/>
+          </a:prstGeom>
+        </p:spPr>
+        <p:style>
+          <a:lnRef idx="2">
+            <a:schemeClr val="accent4">
+              <a:shade val="50000"/>
+            </a:schemeClr>
+          </a:lnRef>
+          <a:fillRef idx="1">
+            <a:schemeClr val="accent4"/>
+          </a:fillRef>
+          <a:effectRef idx="0">
+            <a:schemeClr val="accent4"/>
+          </a:effectRef>
+          <a:fontRef idx="minor">
+            <a:schemeClr val="lt1"/>
+          </a:fontRef>
+        </p:style>
+        <p:txBody>
+          <a:bodyPr rtlCol="0" anchor="ctr"/>
+          <a:p>
+            <a:pPr algn="ctr"/>
+            <a:r>
+              <a:rPr lang="en-US"/>
+              <a:t>B</a:t>
+            </a:r>
+            <a:endParaRPr lang="en-US"/>
+          </a:p>
+        </p:txBody>
+      </p:sp>
+      <p:sp>
+        <p:nvSpPr>
+          <p:cNvPr id="10" name="Oval 9"/>
+          <p:cNvSpPr/>
+          <p:nvPr/>
+        </p:nvSpPr>
+        <p:spPr>
+          <a:xfrm>
+            <a:off x="6816725" y="3419475"/>
+            <a:ext cx="330835" cy="330835"/>
+          </a:xfrm>
+          <a:prstGeom prst="ellipse">
+            <a:avLst/>
+          </a:prstGeom>
+        </p:spPr>
+        <p:style>
+          <a:lnRef idx="2">
+            <a:schemeClr val="accent4">
+              <a:shade val="50000"/>
+            </a:schemeClr>
+          </a:lnRef>
+          <a:fillRef idx="1">
+            <a:schemeClr val="accent4"/>
+          </a:fillRef>
+          <a:effectRef idx="0">
+            <a:schemeClr val="accent4"/>
+          </a:effectRef>
+          <a:fontRef idx="minor">
+            <a:schemeClr val="lt1"/>
+          </a:fontRef>
+        </p:style>
+        <p:txBody>
+          <a:bodyPr rtlCol="0" anchor="ctr"/>
+          <a:p>
+            <a:pPr algn="ctr"/>
+            <a:r>
+              <a:rPr lang="en-US"/>
+              <a:t>C</a:t>
+            </a:r>
+            <a:endParaRPr lang="en-US"/>
+          </a:p>
+        </p:txBody>
+      </p:sp>
+      <p:sp>
+        <p:nvSpPr>
+          <p:cNvPr id="11" name="Oval 10"/>
+          <p:cNvSpPr/>
+          <p:nvPr/>
+        </p:nvSpPr>
+        <p:spPr>
+          <a:xfrm>
+            <a:off x="7426325" y="4079875"/>
+            <a:ext cx="330835" cy="330835"/>
+          </a:xfrm>
+          <a:prstGeom prst="ellipse">
+            <a:avLst/>
+          </a:prstGeom>
+        </p:spPr>
+        <p:style>
+          <a:lnRef idx="2">
+            <a:schemeClr val="accent4">
+              <a:shade val="50000"/>
+            </a:schemeClr>
+          </a:lnRef>
+          <a:fillRef idx="1">
+            <a:schemeClr val="accent4"/>
+          </a:fillRef>
+          <a:effectRef idx="0">
+            <a:schemeClr val="accent4"/>
+          </a:effectRef>
+          <a:fontRef idx="minor">
+            <a:schemeClr val="lt1"/>
+          </a:fontRef>
+        </p:style>
+        <p:txBody>
+          <a:bodyPr rtlCol="0" anchor="ctr"/>
+          <a:p>
+            <a:pPr algn="ctr"/>
+            <a:r>
+              <a:rPr lang="en-US"/>
+              <a:t>D</a:t>
+            </a:r>
+            <a:endParaRPr lang="en-US"/>
+          </a:p>
+        </p:txBody>
+      </p:sp>
+      <p:sp>
+        <p:nvSpPr>
+          <p:cNvPr id="12" name="Oval 11"/>
+          <p:cNvSpPr/>
+          <p:nvPr/>
+        </p:nvSpPr>
+        <p:spPr>
+          <a:xfrm>
+            <a:off x="6200775" y="4181475"/>
+            <a:ext cx="330835" cy="330835"/>
+          </a:xfrm>
+          <a:prstGeom prst="ellipse">
+            <a:avLst/>
+          </a:prstGeom>
+        </p:spPr>
+        <p:style>
+          <a:lnRef idx="2">
+            <a:schemeClr val="accent4">
+              <a:shade val="50000"/>
+            </a:schemeClr>
+          </a:lnRef>
+          <a:fillRef idx="1">
+            <a:schemeClr val="accent4"/>
+          </a:fillRef>
+          <a:effectRef idx="0">
+            <a:schemeClr val="accent4"/>
+          </a:effectRef>
+          <a:fontRef idx="minor">
+            <a:schemeClr val="lt1"/>
+          </a:fontRef>
+        </p:style>
+        <p:txBody>
+          <a:bodyPr rtlCol="0" anchor="ctr"/>
+          <a:p>
+            <a:pPr algn="ctr"/>
+            <a:r>
+              <a:rPr lang="en-US"/>
+              <a:t>H</a:t>
+            </a:r>
+            <a:endParaRPr lang="en-US"/>
+          </a:p>
+        </p:txBody>
+      </p:sp>
+      <p:sp>
+        <p:nvSpPr>
+          <p:cNvPr id="13" name="Oval 12"/>
+          <p:cNvSpPr/>
+          <p:nvPr/>
+        </p:nvSpPr>
+        <p:spPr>
+          <a:xfrm>
+            <a:off x="6816725" y="3921125"/>
+            <a:ext cx="330835" cy="330835"/>
+          </a:xfrm>
+          <a:prstGeom prst="ellipse">
+            <a:avLst/>
+          </a:prstGeom>
+        </p:spPr>
+        <p:style>
+          <a:lnRef idx="2">
+            <a:schemeClr val="accent4">
+              <a:shade val="50000"/>
+            </a:schemeClr>
+          </a:lnRef>
+          <a:fillRef idx="1">
+            <a:schemeClr val="accent4"/>
+          </a:fillRef>
+          <a:effectRef idx="0">
+            <a:schemeClr val="accent4"/>
+          </a:effectRef>
+          <a:fontRef idx="minor">
+            <a:schemeClr val="lt1"/>
+          </a:fontRef>
+        </p:style>
+        <p:txBody>
+          <a:bodyPr rtlCol="0" anchor="ctr"/>
+          <a:p>
+            <a:pPr algn="ctr"/>
+            <a:r>
+              <a:rPr lang="en-US"/>
+              <a:t>F</a:t>
+            </a:r>
+            <a:endParaRPr lang="en-US"/>
+          </a:p>
+        </p:txBody>
+      </p:sp>
+      <p:sp>
+        <p:nvSpPr>
+          <p:cNvPr id="14" name="Oval 13"/>
+          <p:cNvSpPr/>
+          <p:nvPr/>
+        </p:nvSpPr>
+        <p:spPr>
+          <a:xfrm>
+            <a:off x="6143625" y="3419475"/>
+            <a:ext cx="330835" cy="330835"/>
+          </a:xfrm>
+          <a:prstGeom prst="ellipse">
+            <a:avLst/>
+          </a:prstGeom>
+        </p:spPr>
+        <p:style>
+          <a:lnRef idx="2">
+            <a:schemeClr val="accent4">
+              <a:shade val="50000"/>
+            </a:schemeClr>
+          </a:lnRef>
+          <a:fillRef idx="1">
+            <a:schemeClr val="accent4"/>
+          </a:fillRef>
+          <a:effectRef idx="0">
+            <a:schemeClr val="accent4"/>
+          </a:effectRef>
+          <a:fontRef idx="minor">
+            <a:schemeClr val="lt1"/>
+          </a:fontRef>
+        </p:style>
+        <p:txBody>
+          <a:bodyPr rtlCol="0" anchor="ctr"/>
+          <a:p>
+            <a:pPr algn="ctr"/>
+            <a:r>
+              <a:rPr lang="en-US"/>
+              <a:t>G</a:t>
+            </a:r>
+            <a:endParaRPr lang="en-US"/>
+          </a:p>
+        </p:txBody>
+      </p:sp>
+      <p:sp>
+        <p:nvSpPr>
+          <p:cNvPr id="15" name="Oval 14"/>
+          <p:cNvSpPr/>
+          <p:nvPr/>
+        </p:nvSpPr>
+        <p:spPr>
+          <a:xfrm>
+            <a:off x="5210175" y="3698875"/>
+            <a:ext cx="330835" cy="330835"/>
+          </a:xfrm>
+          <a:prstGeom prst="ellipse">
+            <a:avLst/>
+          </a:prstGeom>
+        </p:spPr>
+        <p:style>
+          <a:lnRef idx="2">
+            <a:schemeClr val="accent4">
+              <a:shade val="50000"/>
+            </a:schemeClr>
+          </a:lnRef>
+          <a:fillRef idx="1">
+            <a:schemeClr val="accent4"/>
+          </a:fillRef>
+          <a:effectRef idx="0">
+            <a:schemeClr val="accent4"/>
+          </a:effectRef>
+          <a:fontRef idx="minor">
+            <a:schemeClr val="lt1"/>
+          </a:fontRef>
+        </p:style>
+        <p:txBody>
+          <a:bodyPr rtlCol="0" anchor="ctr"/>
+          <a:p>
+            <a:pPr algn="ctr"/>
+            <a:r>
+              <a:rPr lang="en-US"/>
+              <a:t>I</a:t>
+            </a:r>
+            <a:endParaRPr lang="en-US"/>
+          </a:p>
+        </p:txBody>
+      </p:sp>
+      <p:sp>
+        <p:nvSpPr>
+          <p:cNvPr id="16" name="Oval 15"/>
+          <p:cNvSpPr/>
+          <p:nvPr/>
+        </p:nvSpPr>
+        <p:spPr>
+          <a:xfrm>
+            <a:off x="4638675" y="2733675"/>
+            <a:ext cx="330835" cy="330835"/>
+          </a:xfrm>
+          <a:prstGeom prst="ellipse">
+            <a:avLst/>
+          </a:prstGeom>
+        </p:spPr>
+        <p:style>
+          <a:lnRef idx="2">
+            <a:schemeClr val="accent4">
+              <a:shade val="50000"/>
+            </a:schemeClr>
+          </a:lnRef>
+          <a:fillRef idx="1">
+            <a:schemeClr val="accent4"/>
+          </a:fillRef>
+          <a:effectRef idx="0">
+            <a:schemeClr val="accent4"/>
+          </a:effectRef>
+          <a:fontRef idx="minor">
+            <a:schemeClr val="lt1"/>
+          </a:fontRef>
+        </p:style>
+        <p:txBody>
+          <a:bodyPr rtlCol="0" anchor="ctr"/>
+          <a:p>
+            <a:pPr algn="ctr"/>
+            <a:r>
+              <a:rPr lang="en-US"/>
+              <a:t>J</a:t>
+            </a:r>
+            <a:endParaRPr lang="en-US"/>
+          </a:p>
+        </p:txBody>
+      </p:sp>
+      <p:cxnSp>
+        <p:nvCxnSpPr>
+          <p:cNvPr id="17" name="Straight Arrow Connector 16"/>
+          <p:cNvCxnSpPr/>
+          <p:nvPr/>
+        </p:nvCxnSpPr>
+        <p:spPr>
+          <a:xfrm flipH="1" flipV="1">
+            <a:off x="7642860" y="3098165"/>
+            <a:ext cx="196215" cy="222885"/>
+          </a:xfrm>
+          <a:prstGeom prst="straightConnector1">
+            <a:avLst/>
+          </a:prstGeom>
+          <a:ln w="31750">
+            <a:solidFill>
+              <a:srgbClr val="FFC000"/>
+            </a:solidFill>
+            <a:prstDash val="sysDot"/>
+            <a:tailEnd type="arrow"/>
+          </a:ln>
+        </p:spPr>
+        <p:style>
+          <a:lnRef idx="1">
+            <a:schemeClr val="accent1"/>
+          </a:lnRef>
+          <a:fillRef idx="0">
+            <a:schemeClr val="accent1"/>
+          </a:fillRef>
+          <a:effectRef idx="0">
+            <a:schemeClr val="accent1"/>
+          </a:effectRef>
+          <a:fontRef idx="minor">
+            <a:schemeClr val="tx1"/>
+          </a:fontRef>
+        </p:style>
+      </p:cxnSp>
+      <p:cxnSp>
+        <p:nvCxnSpPr>
+          <p:cNvPr id="19" name="Straight Arrow Connector 18"/>
+          <p:cNvCxnSpPr/>
+          <p:nvPr/>
+        </p:nvCxnSpPr>
+        <p:spPr>
+          <a:xfrm flipH="1">
+            <a:off x="7099300" y="3215005"/>
+            <a:ext cx="260985" cy="252730"/>
+          </a:xfrm>
+          <a:prstGeom prst="straightConnector1">
+            <a:avLst/>
+          </a:prstGeom>
+          <a:ln w="31750">
+            <a:solidFill>
+              <a:srgbClr val="FFC000"/>
+            </a:solidFill>
+            <a:prstDash val="sysDot"/>
+            <a:tailEnd type="arrow"/>
+          </a:ln>
+        </p:spPr>
+        <p:style>
+          <a:lnRef idx="1">
+            <a:schemeClr val="accent1"/>
+          </a:lnRef>
+          <a:fillRef idx="0">
+            <a:schemeClr val="accent1"/>
+          </a:fillRef>
+          <a:effectRef idx="0">
+            <a:schemeClr val="accent1"/>
+          </a:effectRef>
+          <a:fontRef idx="minor">
+            <a:schemeClr val="tx1"/>
+          </a:fontRef>
+        </p:style>
+      </p:cxnSp>
+      <p:cxnSp>
+        <p:nvCxnSpPr>
+          <p:cNvPr id="20" name="Straight Arrow Connector 19"/>
+          <p:cNvCxnSpPr/>
+          <p:nvPr/>
+        </p:nvCxnSpPr>
+        <p:spPr>
+          <a:xfrm flipH="1" flipV="1">
+            <a:off x="6531610" y="2653665"/>
+            <a:ext cx="780415" cy="444500"/>
+          </a:xfrm>
+          <a:prstGeom prst="straightConnector1">
+            <a:avLst/>
+          </a:prstGeom>
+          <a:ln w="31750">
+            <a:solidFill>
+              <a:srgbClr val="FFC000"/>
+            </a:solidFill>
+            <a:prstDash val="sysDot"/>
+            <a:tailEnd type="arrow"/>
+          </a:ln>
+        </p:spPr>
+        <p:style>
+          <a:lnRef idx="1">
+            <a:schemeClr val="accent1"/>
+          </a:lnRef>
+          <a:fillRef idx="0">
+            <a:schemeClr val="accent1"/>
+          </a:fillRef>
+          <a:effectRef idx="0">
+            <a:schemeClr val="accent1"/>
+          </a:effectRef>
+          <a:fontRef idx="minor">
+            <a:schemeClr val="tx1"/>
+          </a:fontRef>
+        </p:style>
+      </p:cxnSp>
+      <p:cxnSp>
+        <p:nvCxnSpPr>
+          <p:cNvPr id="23" name="Straight Arrow Connector 22"/>
+          <p:cNvCxnSpPr/>
+          <p:nvPr/>
+        </p:nvCxnSpPr>
+        <p:spPr>
+          <a:xfrm flipH="1">
+            <a:off x="4969510" y="2653665"/>
+            <a:ext cx="1231265" cy="245745"/>
+          </a:xfrm>
+          <a:prstGeom prst="straightConnector1">
+            <a:avLst/>
+          </a:prstGeom>
+          <a:ln w="31750">
+            <a:solidFill>
+              <a:srgbClr val="FFC000"/>
+            </a:solidFill>
+            <a:prstDash val="sysDot"/>
+            <a:tailEnd type="arrow"/>
+          </a:ln>
+        </p:spPr>
+        <p:style>
+          <a:lnRef idx="1">
+            <a:schemeClr val="accent1"/>
+          </a:lnRef>
+          <a:fillRef idx="0">
+            <a:schemeClr val="accent1"/>
+          </a:fillRef>
+          <a:effectRef idx="0">
+            <a:schemeClr val="accent1"/>
+          </a:effectRef>
+          <a:fontRef idx="minor">
+            <a:schemeClr val="tx1"/>
+          </a:fontRef>
+        </p:style>
+      </p:cxnSp>
+      <p:cxnSp>
+        <p:nvCxnSpPr>
+          <p:cNvPr id="24" name="Straight Arrow Connector 23"/>
+          <p:cNvCxnSpPr/>
+          <p:nvPr/>
+        </p:nvCxnSpPr>
+        <p:spPr>
+          <a:xfrm flipH="1">
+            <a:off x="4159250" y="2899410"/>
+            <a:ext cx="479425" cy="412115"/>
+          </a:xfrm>
+          <a:prstGeom prst="straightConnector1">
+            <a:avLst/>
+          </a:prstGeom>
+          <a:ln w="31750">
+            <a:solidFill>
+              <a:srgbClr val="FFC000"/>
+            </a:solidFill>
+            <a:prstDash val="sysDot"/>
+            <a:tailEnd type="arrow"/>
+          </a:ln>
+        </p:spPr>
+        <p:style>
+          <a:lnRef idx="1">
+            <a:schemeClr val="accent1"/>
+          </a:lnRef>
+          <a:fillRef idx="0">
+            <a:schemeClr val="accent1"/>
+          </a:fillRef>
+          <a:effectRef idx="0">
+            <a:schemeClr val="accent1"/>
+          </a:effectRef>
+          <a:fontRef idx="minor">
+            <a:schemeClr val="tx1"/>
+          </a:fontRef>
+        </p:style>
+      </p:cxnSp>
+      <p:cxnSp>
+        <p:nvCxnSpPr>
+          <p:cNvPr id="25" name="Straight Arrow Connector 24"/>
+          <p:cNvCxnSpPr/>
+          <p:nvPr/>
+        </p:nvCxnSpPr>
+        <p:spPr>
+          <a:xfrm flipH="1" flipV="1">
+            <a:off x="4207510" y="3429000"/>
+            <a:ext cx="1002665" cy="435610"/>
+          </a:xfrm>
+          <a:prstGeom prst="straightConnector1">
+            <a:avLst/>
+          </a:prstGeom>
+          <a:ln w="31750">
+            <a:solidFill>
+              <a:srgbClr val="FFC000"/>
+            </a:solidFill>
+            <a:prstDash val="sysDot"/>
+            <a:tailEnd type="arrow"/>
+          </a:ln>
+        </p:spPr>
+        <p:style>
+          <a:lnRef idx="1">
+            <a:schemeClr val="accent1"/>
+          </a:lnRef>
+          <a:fillRef idx="0">
+            <a:schemeClr val="accent1"/>
+          </a:fillRef>
+          <a:effectRef idx="0">
+            <a:schemeClr val="accent1"/>
+          </a:effectRef>
+          <a:fontRef idx="minor">
+            <a:schemeClr val="tx1"/>
+          </a:fontRef>
+        </p:style>
+      </p:cxnSp>
+      <p:cxnSp>
+        <p:nvCxnSpPr>
+          <p:cNvPr id="26" name="Straight Arrow Connector 25"/>
+          <p:cNvCxnSpPr/>
+          <p:nvPr/>
+        </p:nvCxnSpPr>
+        <p:spPr>
+          <a:xfrm flipH="1" flipV="1">
+            <a:off x="5492750" y="3981450"/>
+            <a:ext cx="708025" cy="365760"/>
+          </a:xfrm>
+          <a:prstGeom prst="straightConnector1">
+            <a:avLst/>
+          </a:prstGeom>
+          <a:ln w="31750">
+            <a:solidFill>
+              <a:srgbClr val="FFC000"/>
+            </a:solidFill>
+            <a:prstDash val="sysDot"/>
+            <a:tailEnd type="arrow"/>
+          </a:ln>
+        </p:spPr>
+        <p:style>
+          <a:lnRef idx="1">
+            <a:schemeClr val="accent1"/>
+          </a:lnRef>
+          <a:fillRef idx="0">
+            <a:schemeClr val="accent1"/>
+          </a:fillRef>
+          <a:effectRef idx="0">
+            <a:schemeClr val="accent1"/>
+          </a:effectRef>
+          <a:fontRef idx="minor">
+            <a:schemeClr val="tx1"/>
+          </a:fontRef>
+        </p:style>
+      </p:cxnSp>
+      <p:cxnSp>
+        <p:nvCxnSpPr>
+          <p:cNvPr id="27" name="Straight Arrow Connector 26"/>
+          <p:cNvCxnSpPr/>
+          <p:nvPr/>
+        </p:nvCxnSpPr>
+        <p:spPr>
+          <a:xfrm flipH="1">
+            <a:off x="5492750" y="3585210"/>
+            <a:ext cx="650875" cy="161925"/>
+          </a:xfrm>
+          <a:prstGeom prst="straightConnector1">
+            <a:avLst/>
+          </a:prstGeom>
+          <a:ln w="31750">
+            <a:solidFill>
+              <a:srgbClr val="FFC000"/>
+            </a:solidFill>
+            <a:prstDash val="sysDot"/>
+            <a:tailEnd type="arrow"/>
+          </a:ln>
+        </p:spPr>
+        <p:style>
+          <a:lnRef idx="1">
+            <a:schemeClr val="accent1"/>
+          </a:lnRef>
+          <a:fillRef idx="0">
+            <a:schemeClr val="accent1"/>
+          </a:fillRef>
+          <a:effectRef idx="0">
+            <a:schemeClr val="accent1"/>
+          </a:effectRef>
+          <a:fontRef idx="minor">
+            <a:schemeClr val="tx1"/>
+          </a:fontRef>
+        </p:style>
+      </p:cxnSp>
+      <p:cxnSp>
+        <p:nvCxnSpPr>
+          <p:cNvPr id="28" name="Straight Arrow Connector 27"/>
+          <p:cNvCxnSpPr/>
+          <p:nvPr/>
+        </p:nvCxnSpPr>
+        <p:spPr>
+          <a:xfrm flipH="1">
+            <a:off x="6474460" y="3585210"/>
+            <a:ext cx="342265" cy="0"/>
+          </a:xfrm>
+          <a:prstGeom prst="straightConnector1">
+            <a:avLst/>
+          </a:prstGeom>
+          <a:ln w="31750">
+            <a:solidFill>
+              <a:srgbClr val="FFC000"/>
+            </a:solidFill>
+            <a:prstDash val="sysDot"/>
+            <a:tailEnd type="arrow"/>
+          </a:ln>
+        </p:spPr>
+        <p:style>
+          <a:lnRef idx="1">
+            <a:schemeClr val="accent1"/>
+          </a:lnRef>
+          <a:fillRef idx="0">
+            <a:schemeClr val="accent1"/>
+          </a:fillRef>
+          <a:effectRef idx="0">
+            <a:schemeClr val="accent1"/>
+          </a:effectRef>
+          <a:fontRef idx="minor">
+            <a:schemeClr val="tx1"/>
+          </a:fontRef>
+        </p:style>
+      </p:cxnSp>
+      <p:cxnSp>
+        <p:nvCxnSpPr>
+          <p:cNvPr id="29" name="Straight Arrow Connector 28"/>
+          <p:cNvCxnSpPr/>
+          <p:nvPr/>
+        </p:nvCxnSpPr>
+        <p:spPr>
+          <a:xfrm flipH="1">
+            <a:off x="6531610" y="4086860"/>
+            <a:ext cx="285115" cy="260350"/>
+          </a:xfrm>
+          <a:prstGeom prst="straightConnector1">
+            <a:avLst/>
+          </a:prstGeom>
+          <a:ln w="31750">
+            <a:solidFill>
+              <a:srgbClr val="FFC000"/>
+            </a:solidFill>
+            <a:prstDash val="sysDot"/>
+            <a:tailEnd type="arrow"/>
+          </a:ln>
+        </p:spPr>
+        <p:style>
+          <a:lnRef idx="1">
+            <a:schemeClr val="accent1"/>
+          </a:lnRef>
+          <a:fillRef idx="0">
+            <a:schemeClr val="accent1"/>
+          </a:fillRef>
+          <a:effectRef idx="0">
+            <a:schemeClr val="accent1"/>
+          </a:effectRef>
+          <a:fontRef idx="minor">
+            <a:schemeClr val="tx1"/>
+          </a:fontRef>
+        </p:style>
+      </p:cxnSp>
+      <p:cxnSp>
+        <p:nvCxnSpPr>
+          <p:cNvPr id="30" name="Straight Arrow Connector 29"/>
+          <p:cNvCxnSpPr/>
+          <p:nvPr/>
+        </p:nvCxnSpPr>
+        <p:spPr>
+          <a:xfrm flipH="1" flipV="1">
+            <a:off x="7172325" y="4060825"/>
+            <a:ext cx="254000" cy="184785"/>
+          </a:xfrm>
+          <a:prstGeom prst="straightConnector1">
+            <a:avLst/>
+          </a:prstGeom>
+          <a:ln w="31750">
+            <a:solidFill>
+              <a:srgbClr val="FFC000"/>
+            </a:solidFill>
+            <a:prstDash val="sysDot"/>
+            <a:tailEnd type="arrow"/>
+          </a:ln>
+        </p:spPr>
+        <p:style>
+          <a:lnRef idx="1">
+            <a:schemeClr val="accent1"/>
+          </a:lnRef>
+          <a:fillRef idx="0">
+            <a:schemeClr val="accent1"/>
+          </a:fillRef>
+          <a:effectRef idx="0">
+            <a:schemeClr val="accent1"/>
+          </a:effectRef>
+          <a:fontRef idx="minor">
+            <a:schemeClr val="tx1"/>
+          </a:fontRef>
+        </p:style>
+      </p:cxnSp>
+      <p:cxnSp>
+        <p:nvCxnSpPr>
+          <p:cNvPr id="31" name="Straight Arrow Connector 30"/>
+          <p:cNvCxnSpPr>
+            <a:stCxn id="4" idx="4"/>
+            <a:endCxn id="11" idx="7"/>
+          </p:cNvCxnSpPr>
+          <p:nvPr/>
+        </p:nvCxnSpPr>
+        <p:spPr>
+          <a:xfrm flipH="1">
+            <a:off x="7708900" y="3486150"/>
+            <a:ext cx="295910" cy="641985"/>
+          </a:xfrm>
+          <a:prstGeom prst="straightConnector1">
+            <a:avLst/>
+          </a:prstGeom>
+          <a:ln w="31750">
+            <a:solidFill>
+              <a:srgbClr val="FFC000"/>
+            </a:solidFill>
+            <a:prstDash val="sysDot"/>
+            <a:tailEnd type="arrow"/>
+          </a:ln>
+        </p:spPr>
+        <p:style>
+          <a:lnRef idx="1">
+            <a:schemeClr val="accent1"/>
+          </a:lnRef>
+          <a:fillRef idx="0">
+            <a:schemeClr val="accent1"/>
+          </a:fillRef>
+          <a:effectRef idx="0">
+            <a:schemeClr val="accent1"/>
+          </a:effectRef>
+          <a:fontRef idx="minor">
+            <a:schemeClr val="tx1"/>
+          </a:fontRef>
+        </p:style>
+      </p:cxnSp>
+    </p:spTree>
+  </p:cSld>
+  <p:clrMapOvr>
+    <a:masterClrMapping/>
+  </p:clrMapOvr>
+  <mc:AlternateContent xmlns:mc="http://schemas.openxmlformats.org/markup-compatibility/2006" xmlns:p159="http://schemas.microsoft.com/office/powerpoint/2015/09/main">
+    <mc:Choice Requires="p159">
+      <p:transition xmlns:p14="http://schemas.microsoft.com/office/powerpoint/2010/main" spd="slow" p14:dur="1000">
+        <p159:morph option="byObject"/>
+      </p:transition>
+    </mc:Choice>
+    <mc:Fallback>
+      <p:transition spd="slow">
+        <p:fade/>
+      </p:transition>
+    </mc:Fallback>
+  </mc:AlternateContent>
+</p:sld>
+</file>
+
+<file path=ppt/slides/slide4.xml><?xml version="1.0" encoding="utf-8"?>
+<p:sld xmlns:a="http://schemas.openxmlformats.org/drawingml/2006/main" xmlns:r="http://schemas.openxmlformats.org/officeDocument/2006/relationships" xmlns:p="http://schemas.openxmlformats.org/presentationml/2006/main">
+  <p:cSld>
+    <p:bg>
+      <p:bgPr>
+        <a:gradFill>
+          <a:gsLst>
+            <a:gs pos="0">
+              <a:srgbClr val="7B32B2"/>
+            </a:gs>
+            <a:gs pos="87000">
+              <a:srgbClr val="401A5D"/>
+            </a:gs>
+          </a:gsLst>
+          <a:lin ang="4560000" scaled="0"/>
+        </a:gradFill>
+        <a:effectLst/>
+      </p:bgPr>
+    </p:bg>
+    <p:spTree>
+      <p:nvGrpSpPr>
+        <p:cNvPr id="1" name=""/>
+        <p:cNvGrpSpPr/>
+        <p:nvPr/>
+      </p:nvGrpSpPr>
+      <p:grpSpPr>
+        <a:xfrm>
+          <a:off x="0" y="0"/>
+          <a:ext cx="0" cy="0"/>
+          <a:chOff x="0" y="0"/>
+          <a:chExt cx="0" cy="0"/>
+        </a:xfrm>
+      </p:grpSpPr>
+      <p:sp>
+        <p:nvSpPr>
+          <p:cNvPr id="3" name="Text Box 2"/>
+          <p:cNvSpPr txBox="1"/>
+          <p:nvPr/>
+        </p:nvSpPr>
+        <p:spPr>
+          <a:xfrm>
+            <a:off x="1880235" y="118745"/>
+            <a:ext cx="8430895" cy="829945"/>
+          </a:xfrm>
+          <a:prstGeom prst="rect">
+            <a:avLst/>
+          </a:prstGeom>
+          <a:noFill/>
+        </p:spPr>
+        <p:txBody>
+          <a:bodyPr wrap="square" rtlCol="0">
+            <a:spAutoFit/>
+          </a:bodyPr>
+          <a:p>
+            <a:pPr algn="ctr"/>
+            <a:r>
+              <a:rPr lang="en-US" sz="3600">
+                <a:solidFill>
+                  <a:schemeClr val="bg1"/>
+                </a:solidFill>
+              </a:rPr>
+              <a:t>DIJKSTRA’S ALGORITHM</a:t>
+            </a:r>
+            <a:endParaRPr lang="en-US" sz="3600">
+              <a:solidFill>
+                <a:schemeClr val="bg1"/>
+              </a:solidFill>
+            </a:endParaRPr>
+          </a:p>
+          <a:p>
+            <a:pPr algn="ctr"/>
+            <a:r>
+              <a:rPr lang="en-US" sz="1200">
+                <a:solidFill>
+                  <a:schemeClr val="bg1"/>
+                </a:solidFill>
+              </a:rPr>
+              <a:t>and it’s use in Google Maps</a:t>
+            </a:r>
+            <a:endParaRPr lang="en-US" sz="1200">
+              <a:solidFill>
+                <a:schemeClr val="bg1"/>
+              </a:solidFill>
+            </a:endParaRPr>
+          </a:p>
+        </p:txBody>
+      </p:sp>
+      <p:sp>
+        <p:nvSpPr>
+          <p:cNvPr id="2" name="Oval 1"/>
+          <p:cNvSpPr/>
+          <p:nvPr/>
+        </p:nvSpPr>
+        <p:spPr>
+          <a:xfrm>
+            <a:off x="264160" y="3091180"/>
+            <a:ext cx="330835" cy="330835"/>
+          </a:xfrm>
+          <a:prstGeom prst="ellipse">
+            <a:avLst/>
+          </a:prstGeom>
+        </p:spPr>
+        <p:style>
+          <a:lnRef idx="2">
+            <a:schemeClr val="accent4">
+              <a:shade val="50000"/>
+            </a:schemeClr>
+          </a:lnRef>
+          <a:fillRef idx="1">
+            <a:schemeClr val="accent4"/>
+          </a:fillRef>
+          <a:effectRef idx="0">
+            <a:schemeClr val="accent4"/>
+          </a:effectRef>
+          <a:fontRef idx="minor">
+            <a:schemeClr val="lt1"/>
+          </a:fontRef>
+        </p:style>
+        <p:txBody>
+          <a:bodyPr rtlCol="0" anchor="ctr"/>
+          <a:p>
+            <a:pPr algn="ctr"/>
+            <a:r>
+              <a:rPr lang="en-US"/>
+              <a:t>E</a:t>
+            </a:r>
+            <a:endParaRPr lang="en-US"/>
+          </a:p>
+        </p:txBody>
+      </p:sp>
+      <p:sp>
+        <p:nvSpPr>
+          <p:cNvPr id="4" name="Oval 3"/>
+          <p:cNvSpPr/>
+          <p:nvPr/>
+        </p:nvSpPr>
+        <p:spPr>
+          <a:xfrm>
+            <a:off x="4226560" y="2976245"/>
+            <a:ext cx="330835" cy="330835"/>
+          </a:xfrm>
+          <a:prstGeom prst="ellipse">
+            <a:avLst/>
+          </a:prstGeom>
+        </p:spPr>
+        <p:style>
+          <a:lnRef idx="2">
+            <a:schemeClr val="accent4">
+              <a:shade val="50000"/>
+            </a:schemeClr>
+          </a:lnRef>
+          <a:fillRef idx="1">
+            <a:schemeClr val="accent4"/>
+          </a:fillRef>
+          <a:effectRef idx="0">
+            <a:schemeClr val="accent4"/>
+          </a:effectRef>
+          <a:fontRef idx="minor">
+            <a:schemeClr val="lt1"/>
+          </a:fontRef>
+        </p:style>
+        <p:txBody>
+          <a:bodyPr rtlCol="0" anchor="ctr"/>
+          <a:p>
+            <a:pPr algn="ctr"/>
+            <a:r>
+              <a:rPr lang="en-US"/>
+              <a:t>S</a:t>
+            </a:r>
+            <a:endParaRPr lang="en-US"/>
+          </a:p>
+        </p:txBody>
+      </p:sp>
+      <p:sp>
+        <p:nvSpPr>
+          <p:cNvPr id="5" name="Oval 4"/>
+          <p:cNvSpPr/>
+          <p:nvPr/>
+        </p:nvSpPr>
+        <p:spPr>
+          <a:xfrm>
+            <a:off x="3699510" y="2760345"/>
+            <a:ext cx="330835" cy="330835"/>
+          </a:xfrm>
+          <a:prstGeom prst="ellipse">
+            <a:avLst/>
+          </a:prstGeom>
+        </p:spPr>
+        <p:style>
+          <a:lnRef idx="2">
+            <a:schemeClr val="accent4">
+              <a:shade val="50000"/>
+            </a:schemeClr>
+          </a:lnRef>
+          <a:fillRef idx="1">
+            <a:schemeClr val="accent4"/>
+          </a:fillRef>
+          <a:effectRef idx="0">
+            <a:schemeClr val="accent4"/>
+          </a:effectRef>
+          <a:fontRef idx="minor">
+            <a:schemeClr val="lt1"/>
+          </a:fontRef>
+        </p:style>
+        <p:txBody>
+          <a:bodyPr rtlCol="0" anchor="ctr"/>
+          <a:p>
+            <a:pPr algn="ctr"/>
+            <a:r>
+              <a:rPr lang="en-US"/>
+              <a:t>A</a:t>
+            </a:r>
+            <a:endParaRPr lang="en-US"/>
+          </a:p>
+        </p:txBody>
+      </p:sp>
+      <p:sp>
+        <p:nvSpPr>
+          <p:cNvPr id="7" name="Oval 6"/>
+          <p:cNvSpPr/>
+          <p:nvPr/>
+        </p:nvSpPr>
+        <p:spPr>
+          <a:xfrm>
+            <a:off x="2588260" y="2315845"/>
+            <a:ext cx="330835" cy="330835"/>
+          </a:xfrm>
+          <a:prstGeom prst="ellipse">
+            <a:avLst/>
+          </a:prstGeom>
+        </p:spPr>
+        <p:style>
+          <a:lnRef idx="2">
+            <a:schemeClr val="accent4">
+              <a:shade val="50000"/>
+            </a:schemeClr>
+          </a:lnRef>
+          <a:fillRef idx="1">
+            <a:schemeClr val="accent4"/>
+          </a:fillRef>
+          <a:effectRef idx="0">
+            <a:schemeClr val="accent4"/>
+          </a:effectRef>
+          <a:fontRef idx="minor">
+            <a:schemeClr val="lt1"/>
+          </a:fontRef>
+        </p:style>
+        <p:txBody>
+          <a:bodyPr rtlCol="0" anchor="ctr"/>
+          <a:p>
+            <a:pPr algn="ctr"/>
+            <a:r>
+              <a:rPr lang="en-US"/>
+              <a:t>B</a:t>
+            </a:r>
+            <a:endParaRPr lang="en-US"/>
+          </a:p>
+        </p:txBody>
+      </p:sp>
+      <p:sp>
+        <p:nvSpPr>
+          <p:cNvPr id="10" name="Oval 9"/>
+          <p:cNvSpPr/>
+          <p:nvPr/>
+        </p:nvSpPr>
+        <p:spPr>
+          <a:xfrm>
+            <a:off x="3204210" y="3247390"/>
+            <a:ext cx="330835" cy="330835"/>
+          </a:xfrm>
+          <a:prstGeom prst="ellipse">
+            <a:avLst/>
+          </a:prstGeom>
+        </p:spPr>
+        <p:style>
+          <a:lnRef idx="2">
+            <a:schemeClr val="accent4">
+              <a:shade val="50000"/>
+            </a:schemeClr>
+          </a:lnRef>
+          <a:fillRef idx="1">
+            <a:schemeClr val="accent4"/>
+          </a:fillRef>
+          <a:effectRef idx="0">
+            <a:schemeClr val="accent4"/>
+          </a:effectRef>
+          <a:fontRef idx="minor">
+            <a:schemeClr val="lt1"/>
+          </a:fontRef>
+        </p:style>
+        <p:txBody>
+          <a:bodyPr rtlCol="0" anchor="ctr"/>
+          <a:p>
+            <a:pPr algn="ctr"/>
+            <a:r>
+              <a:rPr lang="en-US"/>
+              <a:t>C</a:t>
+            </a:r>
+            <a:endParaRPr lang="en-US"/>
+          </a:p>
+        </p:txBody>
+      </p:sp>
+      <p:sp>
+        <p:nvSpPr>
+          <p:cNvPr id="11" name="Oval 10"/>
+          <p:cNvSpPr/>
+          <p:nvPr/>
+        </p:nvSpPr>
+        <p:spPr>
+          <a:xfrm>
+            <a:off x="3813810" y="3907790"/>
+            <a:ext cx="330835" cy="330835"/>
+          </a:xfrm>
+          <a:prstGeom prst="ellipse">
+            <a:avLst/>
+          </a:prstGeom>
+        </p:spPr>
+        <p:style>
+          <a:lnRef idx="2">
+            <a:schemeClr val="accent4">
+              <a:shade val="50000"/>
+            </a:schemeClr>
+          </a:lnRef>
+          <a:fillRef idx="1">
+            <a:schemeClr val="accent4"/>
+          </a:fillRef>
+          <a:effectRef idx="0">
+            <a:schemeClr val="accent4"/>
+          </a:effectRef>
+          <a:fontRef idx="minor">
+            <a:schemeClr val="lt1"/>
+          </a:fontRef>
+        </p:style>
+        <p:txBody>
+          <a:bodyPr rtlCol="0" anchor="ctr"/>
+          <a:p>
+            <a:pPr algn="ctr"/>
+            <a:r>
+              <a:rPr lang="en-US"/>
+              <a:t>D</a:t>
+            </a:r>
+            <a:endParaRPr lang="en-US"/>
+          </a:p>
+        </p:txBody>
+      </p:sp>
+      <p:sp>
+        <p:nvSpPr>
+          <p:cNvPr id="12" name="Oval 11"/>
+          <p:cNvSpPr/>
+          <p:nvPr/>
+        </p:nvSpPr>
+        <p:spPr>
+          <a:xfrm>
+            <a:off x="2588260" y="4009390"/>
+            <a:ext cx="330835" cy="330835"/>
+          </a:xfrm>
+          <a:prstGeom prst="ellipse">
+            <a:avLst/>
+          </a:prstGeom>
+        </p:spPr>
+        <p:style>
+          <a:lnRef idx="2">
+            <a:schemeClr val="accent4">
+              <a:shade val="50000"/>
+            </a:schemeClr>
+          </a:lnRef>
+          <a:fillRef idx="1">
+            <a:schemeClr val="accent4"/>
+          </a:fillRef>
+          <a:effectRef idx="0">
+            <a:schemeClr val="accent4"/>
+          </a:effectRef>
+          <a:fontRef idx="minor">
+            <a:schemeClr val="lt1"/>
+          </a:fontRef>
+        </p:style>
+        <p:txBody>
+          <a:bodyPr rtlCol="0" anchor="ctr"/>
+          <a:p>
+            <a:pPr algn="ctr"/>
+            <a:r>
+              <a:rPr lang="en-US"/>
+              <a:t>H</a:t>
+            </a:r>
+            <a:endParaRPr lang="en-US"/>
+          </a:p>
+        </p:txBody>
+      </p:sp>
+      <p:sp>
+        <p:nvSpPr>
+          <p:cNvPr id="13" name="Oval 12"/>
+          <p:cNvSpPr/>
+          <p:nvPr/>
+        </p:nvSpPr>
+        <p:spPr>
+          <a:xfrm>
+            <a:off x="3204210" y="3749040"/>
+            <a:ext cx="330835" cy="330835"/>
+          </a:xfrm>
+          <a:prstGeom prst="ellipse">
+            <a:avLst/>
+          </a:prstGeom>
+        </p:spPr>
+        <p:style>
+          <a:lnRef idx="2">
+            <a:schemeClr val="accent4">
+              <a:shade val="50000"/>
+            </a:schemeClr>
+          </a:lnRef>
+          <a:fillRef idx="1">
+            <a:schemeClr val="accent4"/>
+          </a:fillRef>
+          <a:effectRef idx="0">
+            <a:schemeClr val="accent4"/>
+          </a:effectRef>
+          <a:fontRef idx="minor">
+            <a:schemeClr val="lt1"/>
+          </a:fontRef>
+        </p:style>
+        <p:txBody>
+          <a:bodyPr rtlCol="0" anchor="ctr"/>
+          <a:p>
+            <a:pPr algn="ctr"/>
+            <a:r>
+              <a:rPr lang="en-US"/>
+              <a:t>F</a:t>
+            </a:r>
+            <a:endParaRPr lang="en-US"/>
+          </a:p>
+        </p:txBody>
+      </p:sp>
+      <p:sp>
+        <p:nvSpPr>
+          <p:cNvPr id="14" name="Oval 13"/>
+          <p:cNvSpPr/>
+          <p:nvPr/>
+        </p:nvSpPr>
+        <p:spPr>
+          <a:xfrm>
+            <a:off x="2531110" y="3247390"/>
+            <a:ext cx="330835" cy="330835"/>
+          </a:xfrm>
+          <a:prstGeom prst="ellipse">
+            <a:avLst/>
+          </a:prstGeom>
+        </p:spPr>
+        <p:style>
+          <a:lnRef idx="2">
+            <a:schemeClr val="accent4">
+              <a:shade val="50000"/>
+            </a:schemeClr>
+          </a:lnRef>
+          <a:fillRef idx="1">
+            <a:schemeClr val="accent4"/>
+          </a:fillRef>
+          <a:effectRef idx="0">
+            <a:schemeClr val="accent4"/>
+          </a:effectRef>
+          <a:fontRef idx="minor">
+            <a:schemeClr val="lt1"/>
+          </a:fontRef>
+        </p:style>
+        <p:txBody>
+          <a:bodyPr rtlCol="0" anchor="ctr"/>
+          <a:p>
+            <a:pPr algn="ctr"/>
+            <a:r>
+              <a:rPr lang="en-US"/>
+              <a:t>G</a:t>
+            </a:r>
+            <a:endParaRPr lang="en-US"/>
+          </a:p>
+        </p:txBody>
+      </p:sp>
+      <p:sp>
+        <p:nvSpPr>
+          <p:cNvPr id="15" name="Oval 14"/>
+          <p:cNvSpPr/>
+          <p:nvPr/>
+        </p:nvSpPr>
+        <p:spPr>
+          <a:xfrm>
+            <a:off x="1597660" y="3526790"/>
+            <a:ext cx="330835" cy="330835"/>
+          </a:xfrm>
+          <a:prstGeom prst="ellipse">
+            <a:avLst/>
+          </a:prstGeom>
+        </p:spPr>
+        <p:style>
+          <a:lnRef idx="2">
+            <a:schemeClr val="accent4">
+              <a:shade val="50000"/>
+            </a:schemeClr>
+          </a:lnRef>
+          <a:fillRef idx="1">
+            <a:schemeClr val="accent4"/>
+          </a:fillRef>
+          <a:effectRef idx="0">
+            <a:schemeClr val="accent4"/>
+          </a:effectRef>
+          <a:fontRef idx="minor">
+            <a:schemeClr val="lt1"/>
+          </a:fontRef>
+        </p:style>
+        <p:txBody>
+          <a:bodyPr rtlCol="0" anchor="ctr"/>
+          <a:p>
+            <a:pPr algn="ctr"/>
+            <a:r>
+              <a:rPr lang="en-US"/>
+              <a:t>I</a:t>
+            </a:r>
+            <a:endParaRPr lang="en-US"/>
+          </a:p>
+        </p:txBody>
+      </p:sp>
+      <p:sp>
+        <p:nvSpPr>
+          <p:cNvPr id="16" name="Oval 15"/>
+          <p:cNvSpPr/>
+          <p:nvPr/>
+        </p:nvSpPr>
+        <p:spPr>
+          <a:xfrm>
+            <a:off x="1026160" y="2561590"/>
+            <a:ext cx="330835" cy="330835"/>
+          </a:xfrm>
+          <a:prstGeom prst="ellipse">
+            <a:avLst/>
+          </a:prstGeom>
+        </p:spPr>
+        <p:style>
+          <a:lnRef idx="2">
+            <a:schemeClr val="accent4">
+              <a:shade val="50000"/>
+            </a:schemeClr>
+          </a:lnRef>
+          <a:fillRef idx="1">
+            <a:schemeClr val="accent4"/>
+          </a:fillRef>
+          <a:effectRef idx="0">
+            <a:schemeClr val="accent4"/>
+          </a:effectRef>
+          <a:fontRef idx="minor">
+            <a:schemeClr val="lt1"/>
+          </a:fontRef>
+        </p:style>
+        <p:txBody>
+          <a:bodyPr rtlCol="0" anchor="ctr"/>
+          <a:p>
+            <a:pPr algn="ctr"/>
+            <a:r>
+              <a:rPr lang="en-US"/>
+              <a:t>J</a:t>
+            </a:r>
+            <a:endParaRPr lang="en-US"/>
+          </a:p>
+        </p:txBody>
+      </p:sp>
+      <p:cxnSp>
+        <p:nvCxnSpPr>
+          <p:cNvPr id="17" name="Straight Arrow Connector 16"/>
+          <p:cNvCxnSpPr/>
+          <p:nvPr/>
+        </p:nvCxnSpPr>
+        <p:spPr>
+          <a:xfrm flipH="1" flipV="1">
+            <a:off x="4030345" y="2926080"/>
+            <a:ext cx="196215" cy="222885"/>
+          </a:xfrm>
+          <a:prstGeom prst="straightConnector1">
+            <a:avLst/>
+          </a:prstGeom>
+          <a:ln w="31750">
+            <a:solidFill>
+              <a:srgbClr val="FFC000"/>
+            </a:solidFill>
+            <a:prstDash val="sysDot"/>
+            <a:tailEnd type="arrow"/>
+          </a:ln>
+        </p:spPr>
+        <p:style>
+          <a:lnRef idx="1">
+            <a:schemeClr val="accent1"/>
+          </a:lnRef>
+          <a:fillRef idx="0">
+            <a:schemeClr val="accent1"/>
+          </a:fillRef>
+          <a:effectRef idx="0">
+            <a:schemeClr val="accent1"/>
+          </a:effectRef>
+          <a:fontRef idx="minor">
+            <a:schemeClr val="tx1"/>
+          </a:fontRef>
+        </p:style>
+      </p:cxnSp>
+      <p:cxnSp>
+        <p:nvCxnSpPr>
+          <p:cNvPr id="19" name="Straight Arrow Connector 18"/>
+          <p:cNvCxnSpPr/>
+          <p:nvPr/>
+        </p:nvCxnSpPr>
+        <p:spPr>
+          <a:xfrm flipH="1">
+            <a:off x="3486785" y="3042920"/>
+            <a:ext cx="260985" cy="252730"/>
+          </a:xfrm>
+          <a:prstGeom prst="straightConnector1">
+            <a:avLst/>
+          </a:prstGeom>
+          <a:ln w="31750">
+            <a:solidFill>
+              <a:srgbClr val="FFC000"/>
+            </a:solidFill>
+            <a:prstDash val="sysDot"/>
+            <a:tailEnd type="arrow"/>
+          </a:ln>
+        </p:spPr>
+        <p:style>
+          <a:lnRef idx="1">
+            <a:schemeClr val="accent1"/>
+          </a:lnRef>
+          <a:fillRef idx="0">
+            <a:schemeClr val="accent1"/>
+          </a:fillRef>
+          <a:effectRef idx="0">
+            <a:schemeClr val="accent1"/>
+          </a:effectRef>
+          <a:fontRef idx="minor">
+            <a:schemeClr val="tx1"/>
+          </a:fontRef>
+        </p:style>
+      </p:cxnSp>
+      <p:cxnSp>
+        <p:nvCxnSpPr>
+          <p:cNvPr id="20" name="Straight Arrow Connector 19"/>
+          <p:cNvCxnSpPr/>
+          <p:nvPr/>
+        </p:nvCxnSpPr>
+        <p:spPr>
+          <a:xfrm flipH="1" flipV="1">
+            <a:off x="2919095" y="2481580"/>
+            <a:ext cx="780415" cy="444500"/>
+          </a:xfrm>
+          <a:prstGeom prst="straightConnector1">
+            <a:avLst/>
+          </a:prstGeom>
+          <a:ln w="31750">
+            <a:solidFill>
+              <a:srgbClr val="FFC000"/>
+            </a:solidFill>
+            <a:prstDash val="sysDot"/>
+            <a:tailEnd type="arrow"/>
+          </a:ln>
+        </p:spPr>
+        <p:style>
+          <a:lnRef idx="1">
+            <a:schemeClr val="accent1"/>
+          </a:lnRef>
+          <a:fillRef idx="0">
+            <a:schemeClr val="accent1"/>
+          </a:fillRef>
+          <a:effectRef idx="0">
+            <a:schemeClr val="accent1"/>
+          </a:effectRef>
+          <a:fontRef idx="minor">
+            <a:schemeClr val="tx1"/>
+          </a:fontRef>
+        </p:style>
+      </p:cxnSp>
+      <p:cxnSp>
+        <p:nvCxnSpPr>
+          <p:cNvPr id="23" name="Straight Arrow Connector 22"/>
+          <p:cNvCxnSpPr/>
+          <p:nvPr/>
+        </p:nvCxnSpPr>
+        <p:spPr>
+          <a:xfrm flipH="1">
+            <a:off x="1356995" y="2481580"/>
+            <a:ext cx="1231265" cy="245745"/>
+          </a:xfrm>
+          <a:prstGeom prst="straightConnector1">
+            <a:avLst/>
+          </a:prstGeom>
+          <a:ln w="31750">
+            <a:solidFill>
+              <a:srgbClr val="FFC000"/>
+            </a:solidFill>
+            <a:prstDash val="sysDot"/>
+            <a:tailEnd type="arrow"/>
+          </a:ln>
+        </p:spPr>
+        <p:style>
+          <a:lnRef idx="1">
+            <a:schemeClr val="accent1"/>
+          </a:lnRef>
+          <a:fillRef idx="0">
+            <a:schemeClr val="accent1"/>
+          </a:fillRef>
+          <a:effectRef idx="0">
+            <a:schemeClr val="accent1"/>
+          </a:effectRef>
+          <a:fontRef idx="minor">
+            <a:schemeClr val="tx1"/>
+          </a:fontRef>
+        </p:style>
+      </p:cxnSp>
+      <p:cxnSp>
+        <p:nvCxnSpPr>
+          <p:cNvPr id="24" name="Straight Arrow Connector 23"/>
+          <p:cNvCxnSpPr/>
+          <p:nvPr/>
+        </p:nvCxnSpPr>
+        <p:spPr>
+          <a:xfrm flipH="1">
+            <a:off x="546735" y="2727325"/>
+            <a:ext cx="479425" cy="412115"/>
+          </a:xfrm>
+          <a:prstGeom prst="straightConnector1">
+            <a:avLst/>
+          </a:prstGeom>
+          <a:ln w="31750">
+            <a:solidFill>
+              <a:srgbClr val="FFC000"/>
+            </a:solidFill>
+            <a:prstDash val="sysDot"/>
+            <a:tailEnd type="arrow"/>
+          </a:ln>
+        </p:spPr>
+        <p:style>
+          <a:lnRef idx="1">
+            <a:schemeClr val="accent1"/>
+          </a:lnRef>
+          <a:fillRef idx="0">
+            <a:schemeClr val="accent1"/>
+          </a:fillRef>
+          <a:effectRef idx="0">
+            <a:schemeClr val="accent1"/>
+          </a:effectRef>
+          <a:fontRef idx="minor">
+            <a:schemeClr val="tx1"/>
+          </a:fontRef>
+        </p:style>
+      </p:cxnSp>
+      <p:cxnSp>
+        <p:nvCxnSpPr>
+          <p:cNvPr id="25" name="Straight Arrow Connector 24"/>
+          <p:cNvCxnSpPr/>
+          <p:nvPr/>
+        </p:nvCxnSpPr>
+        <p:spPr>
+          <a:xfrm flipH="1" flipV="1">
+            <a:off x="594995" y="3256915"/>
+            <a:ext cx="1002665" cy="435610"/>
+          </a:xfrm>
+          <a:prstGeom prst="straightConnector1">
+            <a:avLst/>
+          </a:prstGeom>
+          <a:ln w="31750">
+            <a:solidFill>
+              <a:srgbClr val="FFC000"/>
+            </a:solidFill>
+            <a:prstDash val="sysDot"/>
+            <a:tailEnd type="arrow"/>
+          </a:ln>
+        </p:spPr>
+        <p:style>
+          <a:lnRef idx="1">
+            <a:schemeClr val="accent1"/>
+          </a:lnRef>
+          <a:fillRef idx="0">
+            <a:schemeClr val="accent1"/>
+          </a:fillRef>
+          <a:effectRef idx="0">
+            <a:schemeClr val="accent1"/>
+          </a:effectRef>
+          <a:fontRef idx="minor">
+            <a:schemeClr val="tx1"/>
+          </a:fontRef>
+        </p:style>
+      </p:cxnSp>
+      <p:cxnSp>
+        <p:nvCxnSpPr>
+          <p:cNvPr id="26" name="Straight Arrow Connector 25"/>
+          <p:cNvCxnSpPr/>
+          <p:nvPr/>
+        </p:nvCxnSpPr>
+        <p:spPr>
+          <a:xfrm flipH="1" flipV="1">
+            <a:off x="1880235" y="3809365"/>
+            <a:ext cx="708025" cy="365760"/>
+          </a:xfrm>
+          <a:prstGeom prst="straightConnector1">
+            <a:avLst/>
+          </a:prstGeom>
+          <a:ln w="31750">
+            <a:solidFill>
+              <a:srgbClr val="FFC000"/>
+            </a:solidFill>
+            <a:prstDash val="sysDot"/>
+            <a:tailEnd type="arrow"/>
+          </a:ln>
+        </p:spPr>
+        <p:style>
+          <a:lnRef idx="1">
+            <a:schemeClr val="accent1"/>
+          </a:lnRef>
+          <a:fillRef idx="0">
+            <a:schemeClr val="accent1"/>
+          </a:fillRef>
+          <a:effectRef idx="0">
+            <a:schemeClr val="accent1"/>
+          </a:effectRef>
+          <a:fontRef idx="minor">
+            <a:schemeClr val="tx1"/>
+          </a:fontRef>
+        </p:style>
+      </p:cxnSp>
+      <p:cxnSp>
+        <p:nvCxnSpPr>
+          <p:cNvPr id="27" name="Straight Arrow Connector 26"/>
+          <p:cNvCxnSpPr/>
+          <p:nvPr/>
+        </p:nvCxnSpPr>
+        <p:spPr>
+          <a:xfrm flipH="1">
+            <a:off x="1880235" y="3413125"/>
+            <a:ext cx="650875" cy="161925"/>
+          </a:xfrm>
+          <a:prstGeom prst="straightConnector1">
+            <a:avLst/>
+          </a:prstGeom>
+          <a:ln w="31750">
+            <a:solidFill>
+              <a:srgbClr val="FFC000"/>
+            </a:solidFill>
+            <a:prstDash val="sysDot"/>
+            <a:tailEnd type="arrow"/>
+          </a:ln>
+        </p:spPr>
+        <p:style>
+          <a:lnRef idx="1">
+            <a:schemeClr val="accent1"/>
+          </a:lnRef>
+          <a:fillRef idx="0">
+            <a:schemeClr val="accent1"/>
+          </a:fillRef>
+          <a:effectRef idx="0">
+            <a:schemeClr val="accent1"/>
+          </a:effectRef>
+          <a:fontRef idx="minor">
+            <a:schemeClr val="tx1"/>
+          </a:fontRef>
+        </p:style>
+      </p:cxnSp>
+      <p:cxnSp>
+        <p:nvCxnSpPr>
+          <p:cNvPr id="28" name="Straight Arrow Connector 27"/>
+          <p:cNvCxnSpPr/>
+          <p:nvPr/>
+        </p:nvCxnSpPr>
+        <p:spPr>
+          <a:xfrm flipH="1">
+            <a:off x="2861945" y="3413125"/>
+            <a:ext cx="342265" cy="0"/>
+          </a:xfrm>
+          <a:prstGeom prst="straightConnector1">
+            <a:avLst/>
+          </a:prstGeom>
+          <a:ln w="31750">
+            <a:solidFill>
+              <a:srgbClr val="FFC000"/>
+            </a:solidFill>
+            <a:prstDash val="sysDot"/>
+            <a:tailEnd type="arrow"/>
+          </a:ln>
+        </p:spPr>
+        <p:style>
+          <a:lnRef idx="1">
+            <a:schemeClr val="accent1"/>
+          </a:lnRef>
+          <a:fillRef idx="0">
+            <a:schemeClr val="accent1"/>
+          </a:fillRef>
+          <a:effectRef idx="0">
+            <a:schemeClr val="accent1"/>
+          </a:effectRef>
+          <a:fontRef idx="minor">
+            <a:schemeClr val="tx1"/>
+          </a:fontRef>
+        </p:style>
+      </p:cxnSp>
+      <p:cxnSp>
+        <p:nvCxnSpPr>
+          <p:cNvPr id="29" name="Straight Arrow Connector 28"/>
+          <p:cNvCxnSpPr/>
+          <p:nvPr/>
+        </p:nvCxnSpPr>
+        <p:spPr>
+          <a:xfrm flipH="1">
+            <a:off x="2919095" y="3914775"/>
+            <a:ext cx="285115" cy="260350"/>
+          </a:xfrm>
+          <a:prstGeom prst="straightConnector1">
+            <a:avLst/>
+          </a:prstGeom>
+          <a:ln w="31750">
+            <a:solidFill>
+              <a:srgbClr val="FFC000"/>
+            </a:solidFill>
+            <a:prstDash val="sysDot"/>
+            <a:tailEnd type="arrow"/>
+          </a:ln>
+        </p:spPr>
+        <p:style>
+          <a:lnRef idx="1">
+            <a:schemeClr val="accent1"/>
+          </a:lnRef>
+          <a:fillRef idx="0">
+            <a:schemeClr val="accent1"/>
+          </a:fillRef>
+          <a:effectRef idx="0">
+            <a:schemeClr val="accent1"/>
+          </a:effectRef>
+          <a:fontRef idx="minor">
+            <a:schemeClr val="tx1"/>
+          </a:fontRef>
+        </p:style>
+      </p:cxnSp>
+      <p:cxnSp>
+        <p:nvCxnSpPr>
+          <p:cNvPr id="30" name="Straight Arrow Connector 29"/>
+          <p:cNvCxnSpPr/>
+          <p:nvPr/>
+        </p:nvCxnSpPr>
+        <p:spPr>
+          <a:xfrm flipH="1" flipV="1">
+            <a:off x="3559810" y="3888740"/>
+            <a:ext cx="254000" cy="184785"/>
+          </a:xfrm>
+          <a:prstGeom prst="straightConnector1">
+            <a:avLst/>
+          </a:prstGeom>
+          <a:ln w="31750">
+            <a:solidFill>
+              <a:srgbClr val="FFC000"/>
+            </a:solidFill>
+            <a:prstDash val="sysDot"/>
+            <a:tailEnd type="arrow"/>
+          </a:ln>
+        </p:spPr>
+        <p:style>
+          <a:lnRef idx="1">
+            <a:schemeClr val="accent1"/>
+          </a:lnRef>
+          <a:fillRef idx="0">
+            <a:schemeClr val="accent1"/>
+          </a:fillRef>
+          <a:effectRef idx="0">
+            <a:schemeClr val="accent1"/>
+          </a:effectRef>
+          <a:fontRef idx="minor">
+            <a:schemeClr val="tx1"/>
+          </a:fontRef>
+        </p:style>
+      </p:cxnSp>
+      <p:cxnSp>
+        <p:nvCxnSpPr>
+          <p:cNvPr id="31" name="Straight Arrow Connector 30"/>
+          <p:cNvCxnSpPr>
+            <a:stCxn id="4" idx="4"/>
+            <a:endCxn id="11" idx="7"/>
+          </p:cNvCxnSpPr>
+          <p:nvPr/>
+        </p:nvCxnSpPr>
+        <p:spPr>
+          <a:xfrm flipH="1">
+            <a:off x="4096385" y="3307080"/>
+            <a:ext cx="295910" cy="648970"/>
+          </a:xfrm>
+          <a:prstGeom prst="straightConnector1">
+            <a:avLst/>
+          </a:prstGeom>
+          <a:ln w="31750">
+            <a:solidFill>
+              <a:srgbClr val="FFC000"/>
+            </a:solidFill>
+            <a:prstDash val="sysDot"/>
+            <a:tailEnd type="arrow"/>
+          </a:ln>
+        </p:spPr>
+        <p:style>
+          <a:lnRef idx="1">
+            <a:schemeClr val="accent1"/>
+          </a:lnRef>
+          <a:fillRef idx="0">
+            <a:schemeClr val="accent1"/>
+          </a:fillRef>
+          <a:effectRef idx="0">
+            <a:schemeClr val="accent1"/>
+          </a:effectRef>
+          <a:fontRef idx="minor">
+            <a:schemeClr val="tx1"/>
+          </a:fontRef>
+        </p:style>
+      </p:cxnSp>
+      <p:sp>
+        <p:nvSpPr>
+          <p:cNvPr id="6" name="Left Bracket 5"/>
+          <p:cNvSpPr/>
+          <p:nvPr/>
+        </p:nvSpPr>
+        <p:spPr>
+          <a:xfrm>
+            <a:off x="9380855" y="1892300"/>
+            <a:ext cx="914400" cy="2345690"/>
+          </a:xfrm>
+          <a:prstGeom prst="leftBracket">
+            <a:avLst/>
+          </a:prstGeom>
+          <a:ln w="47625"/>
+        </p:spPr>
+        <p:style>
+          <a:lnRef idx="3">
+            <a:schemeClr val="accent4"/>
+          </a:lnRef>
+          <a:fillRef idx="0">
+            <a:schemeClr val="accent4"/>
+          </a:fillRef>
+          <a:effectRef idx="2">
+            <a:schemeClr val="accent4"/>
+          </a:effectRef>
+          <a:fontRef idx="minor">
+            <a:schemeClr val="tx1"/>
+          </a:fontRef>
+        </p:style>
+        <p:txBody>
+          <a:bodyPr rtlCol="0" anchor="ctr"/>
+          <a:p>
+            <a:pPr algn="ctr"/>
+            <a:endParaRPr lang="en-US"/>
+          </a:p>
+        </p:txBody>
+      </p:sp>
+      <p:sp>
+        <p:nvSpPr>
+          <p:cNvPr id="8" name="Rounded Rectangle 7"/>
+          <p:cNvSpPr/>
+          <p:nvPr/>
+        </p:nvSpPr>
+        <p:spPr>
+          <a:xfrm>
+            <a:off x="9380855" y="1294765"/>
+            <a:ext cx="1996440" cy="506730"/>
+          </a:xfrm>
+          <a:prstGeom prst="roundRect">
+            <a:avLst/>
+          </a:prstGeom>
+          <a:solidFill>
+            <a:srgbClr val="FFC000"/>
+          </a:solidFill>
+          <a:ln>
+            <a:solidFill>
+              <a:srgbClr val="FFC000"/>
+            </a:solidFill>
+          </a:ln>
+        </p:spPr>
+        <p:style>
+          <a:lnRef idx="2">
+            <a:schemeClr val="accent1">
+              <a:shade val="50000"/>
+            </a:schemeClr>
+          </a:lnRef>
+          <a:fillRef idx="1">
+            <a:schemeClr val="accent1"/>
+          </a:fillRef>
+          <a:effectRef idx="0">
+            <a:schemeClr val="accent1"/>
+          </a:effectRef>
+          <a:fontRef idx="minor">
+            <a:schemeClr val="lt1"/>
+          </a:fontRef>
+        </p:style>
+        <p:txBody>
+          <a:bodyPr rtlCol="0" anchor="ctr"/>
+          <a:p>
+            <a:pPr algn="ctr"/>
+            <a:r>
+              <a:rPr lang="en-US"/>
+              <a:t>City</a:t>
+            </a:r>
+            <a:endParaRPr lang="en-US"/>
+          </a:p>
+        </p:txBody>
+      </p:sp>
+      <p:sp>
+        <p:nvSpPr>
+          <p:cNvPr id="9" name="Rounded Rectangle 8"/>
+          <p:cNvSpPr/>
+          <p:nvPr/>
+        </p:nvSpPr>
+        <p:spPr>
+          <a:xfrm>
+            <a:off x="9625965" y="2147570"/>
+            <a:ext cx="1996440" cy="506730"/>
+          </a:xfrm>
+          <a:prstGeom prst="roundRect">
+            <a:avLst/>
+          </a:prstGeom>
+          <a:solidFill>
+            <a:srgbClr val="FFC000"/>
+          </a:solidFill>
+          <a:ln>
+            <a:solidFill>
+              <a:srgbClr val="FFC000"/>
+            </a:solidFill>
+          </a:ln>
+        </p:spPr>
+        <p:style>
+          <a:lnRef idx="2">
+            <a:schemeClr val="accent1">
+              <a:shade val="50000"/>
+            </a:schemeClr>
+          </a:lnRef>
+          <a:fillRef idx="1">
+            <a:schemeClr val="accent1"/>
+          </a:fillRef>
+          <a:effectRef idx="0">
+            <a:schemeClr val="accent1"/>
+          </a:effectRef>
+          <a:fontRef idx="minor">
+            <a:schemeClr val="lt1"/>
+          </a:fontRef>
+        </p:style>
+        <p:txBody>
+          <a:bodyPr rtlCol="0" anchor="ctr"/>
+          <a:p>
+            <a:pPr algn="ctr"/>
+            <a:r>
+              <a:rPr lang="en-US"/>
+              <a:t>Name: String</a:t>
+            </a:r>
+            <a:endParaRPr lang="en-US"/>
+          </a:p>
+        </p:txBody>
+      </p:sp>
+      <p:sp>
+        <p:nvSpPr>
+          <p:cNvPr id="18" name="Rounded Rectangle 17"/>
+          <p:cNvSpPr/>
+          <p:nvPr/>
+        </p:nvSpPr>
+        <p:spPr>
+          <a:xfrm>
+            <a:off x="9545320" y="3482975"/>
+            <a:ext cx="2158365" cy="506730"/>
+          </a:xfrm>
+          <a:prstGeom prst="roundRect">
+            <a:avLst/>
+          </a:prstGeom>
+          <a:solidFill>
+            <a:srgbClr val="FFC000"/>
+          </a:solidFill>
+          <a:ln>
+            <a:solidFill>
+              <a:srgbClr val="FFC000"/>
+            </a:solidFill>
+          </a:ln>
+        </p:spPr>
+        <p:style>
+          <a:lnRef idx="2">
+            <a:schemeClr val="accent1">
+              <a:shade val="50000"/>
+            </a:schemeClr>
+          </a:lnRef>
+          <a:fillRef idx="1">
+            <a:schemeClr val="accent1"/>
+          </a:fillRef>
+          <a:effectRef idx="0">
+            <a:schemeClr val="accent1"/>
+          </a:effectRef>
+          <a:fontRef idx="minor">
+            <a:schemeClr val="lt1"/>
+          </a:fontRef>
+        </p:style>
+        <p:txBody>
+          <a:bodyPr rtlCol="0" anchor="ctr"/>
+          <a:p>
+            <a:pPr algn="ctr"/>
+            <a:r>
+              <a:rPr lang="en-US"/>
+              <a:t>Neighbours: [Path]</a:t>
+            </a:r>
+            <a:endParaRPr lang="en-US"/>
+          </a:p>
+        </p:txBody>
+      </p:sp>
+      <p:sp>
+        <p:nvSpPr>
+          <p:cNvPr id="21" name="Left Bracket 20"/>
+          <p:cNvSpPr/>
+          <p:nvPr/>
+        </p:nvSpPr>
+        <p:spPr>
+          <a:xfrm>
+            <a:off x="6137275" y="1892300"/>
+            <a:ext cx="914400" cy="2322830"/>
+          </a:xfrm>
+          <a:prstGeom prst="leftBracket">
+            <a:avLst/>
+          </a:prstGeom>
+          <a:ln w="47625"/>
+        </p:spPr>
+        <p:style>
+          <a:lnRef idx="3">
+            <a:schemeClr val="accent4"/>
+          </a:lnRef>
+          <a:fillRef idx="0">
+            <a:schemeClr val="accent4"/>
+          </a:fillRef>
+          <a:effectRef idx="2">
+            <a:schemeClr val="accent4"/>
+          </a:effectRef>
+          <a:fontRef idx="minor">
+            <a:schemeClr val="tx1"/>
+          </a:fontRef>
+        </p:style>
+        <p:txBody>
+          <a:bodyPr rtlCol="0" anchor="ctr"/>
+          <a:p>
+            <a:pPr algn="ctr"/>
+            <a:endParaRPr lang="en-US"/>
+          </a:p>
+        </p:txBody>
+      </p:sp>
+      <p:sp>
+        <p:nvSpPr>
+          <p:cNvPr id="22" name="Rounded Rectangle 21"/>
+          <p:cNvSpPr/>
+          <p:nvPr/>
+        </p:nvSpPr>
+        <p:spPr>
+          <a:xfrm>
+            <a:off x="6137275" y="1294765"/>
+            <a:ext cx="1996440" cy="506730"/>
+          </a:xfrm>
+          <a:prstGeom prst="roundRect">
+            <a:avLst/>
+          </a:prstGeom>
+          <a:solidFill>
+            <a:srgbClr val="FFC000"/>
+          </a:solidFill>
+          <a:ln>
+            <a:solidFill>
+              <a:srgbClr val="FFC000"/>
+            </a:solidFill>
+          </a:ln>
+        </p:spPr>
+        <p:style>
+          <a:lnRef idx="2">
+            <a:schemeClr val="accent1">
+              <a:shade val="50000"/>
+            </a:schemeClr>
+          </a:lnRef>
+          <a:fillRef idx="1">
+            <a:schemeClr val="accent1"/>
+          </a:fillRef>
+          <a:effectRef idx="0">
+            <a:schemeClr val="accent1"/>
+          </a:effectRef>
+          <a:fontRef idx="minor">
+            <a:schemeClr val="lt1"/>
+          </a:fontRef>
+        </p:style>
+        <p:txBody>
+          <a:bodyPr rtlCol="0" anchor="ctr"/>
+          <a:p>
+            <a:pPr algn="ctr"/>
+            <a:r>
+              <a:rPr lang="en-US"/>
+              <a:t>Path</a:t>
+            </a:r>
+            <a:endParaRPr lang="en-US"/>
+          </a:p>
+        </p:txBody>
+      </p:sp>
+      <p:sp>
+        <p:nvSpPr>
+          <p:cNvPr id="32" name="Rounded Rectangle 31"/>
+          <p:cNvSpPr/>
+          <p:nvPr/>
+        </p:nvSpPr>
+        <p:spPr>
+          <a:xfrm>
+            <a:off x="6309360" y="2179955"/>
+            <a:ext cx="1996440" cy="506730"/>
+          </a:xfrm>
+          <a:prstGeom prst="roundRect">
+            <a:avLst/>
+          </a:prstGeom>
+          <a:solidFill>
+            <a:srgbClr val="FFC000"/>
+          </a:solidFill>
+          <a:ln>
+            <a:solidFill>
+              <a:srgbClr val="FFC000"/>
+            </a:solidFill>
+          </a:ln>
+        </p:spPr>
+        <p:style>
+          <a:lnRef idx="2">
+            <a:schemeClr val="accent1">
+              <a:shade val="50000"/>
+            </a:schemeClr>
+          </a:lnRef>
+          <a:fillRef idx="1">
+            <a:schemeClr val="accent1"/>
+          </a:fillRef>
+          <a:effectRef idx="0">
+            <a:schemeClr val="accent1"/>
+          </a:effectRef>
+          <a:fontRef idx="minor">
+            <a:schemeClr val="lt1"/>
+          </a:fontRef>
+        </p:style>
+        <p:txBody>
+          <a:bodyPr rtlCol="0" anchor="ctr"/>
+          <a:p>
+            <a:pPr algn="ctr"/>
+            <a:r>
+              <a:rPr lang="en-US"/>
+              <a:t>From: String</a:t>
+            </a:r>
+            <a:endParaRPr lang="en-US"/>
+          </a:p>
+        </p:txBody>
+      </p:sp>
+      <p:sp>
+        <p:nvSpPr>
+          <p:cNvPr id="33" name="Rounded Rectangle 32"/>
+          <p:cNvSpPr/>
+          <p:nvPr/>
+        </p:nvSpPr>
+        <p:spPr>
+          <a:xfrm>
+            <a:off x="6309360" y="3482975"/>
+            <a:ext cx="1996440" cy="506730"/>
+          </a:xfrm>
+          <a:prstGeom prst="roundRect">
+            <a:avLst/>
+          </a:prstGeom>
+          <a:solidFill>
+            <a:srgbClr val="FFC000"/>
+          </a:solidFill>
+          <a:ln>
+            <a:solidFill>
+              <a:srgbClr val="FFC000"/>
+            </a:solidFill>
+          </a:ln>
+        </p:spPr>
+        <p:style>
+          <a:lnRef idx="2">
+            <a:schemeClr val="accent1">
+              <a:shade val="50000"/>
+            </a:schemeClr>
+          </a:lnRef>
+          <a:fillRef idx="1">
+            <a:schemeClr val="accent1"/>
+          </a:fillRef>
+          <a:effectRef idx="0">
+            <a:schemeClr val="accent1"/>
+          </a:effectRef>
+          <a:fontRef idx="minor">
+            <a:schemeClr val="lt1"/>
+          </a:fontRef>
+        </p:style>
+        <p:txBody>
+          <a:bodyPr rtlCol="0" anchor="ctr"/>
+          <a:p>
+            <a:pPr algn="ctr"/>
+            <a:r>
+              <a:rPr lang="en-US"/>
+              <a:t>Cost</a:t>
+            </a:r>
+            <a:endParaRPr lang="en-US"/>
+          </a:p>
+        </p:txBody>
+      </p:sp>
+      <p:sp>
+        <p:nvSpPr>
+          <p:cNvPr id="34" name="Rounded Rectangle 33"/>
+          <p:cNvSpPr/>
+          <p:nvPr/>
+        </p:nvSpPr>
+        <p:spPr>
+          <a:xfrm>
+            <a:off x="6309360" y="2800350"/>
+            <a:ext cx="1996440" cy="506730"/>
+          </a:xfrm>
+          <a:prstGeom prst="roundRect">
+            <a:avLst/>
+          </a:prstGeom>
+          <a:solidFill>
+            <a:srgbClr val="FFC000"/>
+          </a:solidFill>
+          <a:ln>
+            <a:solidFill>
+              <a:srgbClr val="FFC000"/>
+            </a:solidFill>
+          </a:ln>
+        </p:spPr>
+        <p:style>
+          <a:lnRef idx="2">
+            <a:schemeClr val="accent1">
+              <a:shade val="50000"/>
+            </a:schemeClr>
+          </a:lnRef>
+          <a:fillRef idx="1">
+            <a:schemeClr val="accent1"/>
+          </a:fillRef>
+          <a:effectRef idx="0">
+            <a:schemeClr val="accent1"/>
+          </a:effectRef>
+          <a:fontRef idx="minor">
+            <a:schemeClr val="lt1"/>
+          </a:fontRef>
+        </p:style>
+        <p:txBody>
+          <a:bodyPr rtlCol="0" anchor="ctr"/>
+          <a:p>
+            <a:pPr algn="ctr"/>
+            <a:r>
+              <a:rPr lang="en-US"/>
+              <a:t>To: String</a:t>
+            </a:r>
+            <a:endParaRPr lang="en-US"/>
+          </a:p>
+        </p:txBody>
+      </p:sp>
+      <p:sp>
+        <p:nvSpPr>
+          <p:cNvPr id="35" name="Rounded Rectangle 34"/>
+          <p:cNvSpPr/>
+          <p:nvPr/>
+        </p:nvSpPr>
+        <p:spPr>
+          <a:xfrm>
+            <a:off x="9625965" y="2811780"/>
+            <a:ext cx="2158365" cy="506730"/>
+          </a:xfrm>
+          <a:prstGeom prst="roundRect">
+            <a:avLst/>
+          </a:prstGeom>
+          <a:solidFill>
+            <a:srgbClr val="FFC000"/>
+          </a:solidFill>
+          <a:ln>
+            <a:solidFill>
+              <a:srgbClr val="FFC000"/>
+            </a:solidFill>
+          </a:ln>
+        </p:spPr>
+        <p:style>
+          <a:lnRef idx="2">
+            <a:schemeClr val="accent1">
+              <a:shade val="50000"/>
+            </a:schemeClr>
+          </a:lnRef>
+          <a:fillRef idx="1">
+            <a:schemeClr val="accent1"/>
+          </a:fillRef>
+          <a:effectRef idx="0">
+            <a:schemeClr val="accent1"/>
+          </a:effectRef>
+          <a:fontRef idx="minor">
+            <a:schemeClr val="lt1"/>
+          </a:fontRef>
+        </p:style>
+        <p:txBody>
+          <a:bodyPr rtlCol="0" anchor="ctr"/>
+          <a:p>
+            <a:pPr algn="ctr"/>
+            <a:r>
+              <a:rPr lang="en-US"/>
+              <a:t>Smallest Cost: int</a:t>
+            </a:r>
+            <a:endParaRPr lang="en-US"/>
+          </a:p>
+        </p:txBody>
+      </p:sp>
+    </p:spTree>
+  </p:cSld>
+  <p:clrMapOvr>
+    <a:masterClrMapping/>
+  </p:clrMapOvr>
+  <mc:AlternateContent xmlns:mc="http://schemas.openxmlformats.org/markup-compatibility/2006" xmlns:p159="http://schemas.microsoft.com/office/powerpoint/2015/09/main">
+    <mc:Choice Requires="p159">
+      <p:transition xmlns:p14="http://schemas.microsoft.com/office/powerpoint/2010/main" spd="slow" p14:dur="1000">
+        <p159:morph option="byObject"/>
+      </p:transition>
+    </mc:Choice>
+    <mc:Fallback>
+      <p:transition spd="slow">
+        <p:fade/>
+      </p:transition>
+    </mc:Fallback>
+  </mc:AlternateContent>
+</p:sld>
+</file>
+
+<file path=ppt/slides/slide5.xml><?xml version="1.0" encoding="utf-8"?>
+<p:sld xmlns:a="http://schemas.openxmlformats.org/drawingml/2006/main" xmlns:r="http://schemas.openxmlformats.org/officeDocument/2006/relationships" xmlns:p="http://schemas.openxmlformats.org/presentationml/2006/main">
+  <p:cSld>
+    <p:bg>
+      <p:bgPr>
+        <a:gradFill>
+          <a:gsLst>
+            <a:gs pos="0">
+              <a:srgbClr val="7B32B2"/>
+            </a:gs>
+            <a:gs pos="87000">
+              <a:srgbClr val="401A5D"/>
+            </a:gs>
+          </a:gsLst>
+          <a:lin ang="4560000" scaled="0"/>
+        </a:gradFill>
+        <a:effectLst/>
+      </p:bgPr>
+    </p:bg>
+    <p:spTree>
+      <p:nvGrpSpPr>
+        <p:cNvPr id="1" name=""/>
+        <p:cNvGrpSpPr/>
+        <p:nvPr/>
+      </p:nvGrpSpPr>
+      <p:grpSpPr>
+        <a:xfrm>
+          <a:off x="0" y="0"/>
+          <a:ext cx="0" cy="0"/>
+          <a:chOff x="0" y="0"/>
+          <a:chExt cx="0" cy="0"/>
+        </a:xfrm>
+      </p:grpSpPr>
+      <p:sp>
+        <p:nvSpPr>
+          <p:cNvPr id="3" name="Text Box 2"/>
+          <p:cNvSpPr txBox="1"/>
+          <p:nvPr/>
+        </p:nvSpPr>
+        <p:spPr>
+          <a:xfrm>
+            <a:off x="1880235" y="118745"/>
+            <a:ext cx="8430895" cy="829945"/>
+          </a:xfrm>
+          <a:prstGeom prst="rect">
+            <a:avLst/>
+          </a:prstGeom>
+          <a:noFill/>
+        </p:spPr>
+        <p:txBody>
+          <a:bodyPr wrap="square" rtlCol="0">
+            <a:spAutoFit/>
+          </a:bodyPr>
+          <a:p>
+            <a:pPr algn="ctr"/>
+            <a:r>
+              <a:rPr lang="en-US" sz="3600">
+                <a:solidFill>
+                  <a:schemeClr val="bg1"/>
+                </a:solidFill>
+              </a:rPr>
+              <a:t>DIJKSTRA’S ALGORITHM</a:t>
+            </a:r>
+            <a:endParaRPr lang="en-US" sz="3600">
+              <a:solidFill>
+                <a:schemeClr val="bg1"/>
+              </a:solidFill>
+            </a:endParaRPr>
+          </a:p>
+          <a:p>
+            <a:pPr algn="ctr"/>
+            <a:r>
+              <a:rPr lang="en-US" sz="1200">
+                <a:solidFill>
+                  <a:schemeClr val="bg1"/>
+                </a:solidFill>
+              </a:rPr>
+              <a:t>and it’s use in Google Maps</a:t>
+            </a:r>
+            <a:endParaRPr lang="en-US" sz="1200">
+              <a:solidFill>
+                <a:schemeClr val="bg1"/>
+              </a:solidFill>
+            </a:endParaRPr>
+          </a:p>
+        </p:txBody>
+      </p:sp>
+      <p:sp>
+        <p:nvSpPr>
+          <p:cNvPr id="2" name="Oval 1"/>
+          <p:cNvSpPr/>
+          <p:nvPr/>
+        </p:nvSpPr>
+        <p:spPr>
+          <a:xfrm>
+            <a:off x="264160" y="3091180"/>
+            <a:ext cx="330835" cy="330835"/>
+          </a:xfrm>
+          <a:prstGeom prst="ellipse">
+            <a:avLst/>
+          </a:prstGeom>
+        </p:spPr>
+        <p:style>
+          <a:lnRef idx="2">
+            <a:schemeClr val="accent4">
+              <a:shade val="50000"/>
+            </a:schemeClr>
+          </a:lnRef>
+          <a:fillRef idx="1">
+            <a:schemeClr val="accent4"/>
+          </a:fillRef>
+          <a:effectRef idx="0">
+            <a:schemeClr val="accent4"/>
+          </a:effectRef>
+          <a:fontRef idx="minor">
+            <a:schemeClr val="lt1"/>
+          </a:fontRef>
+        </p:style>
+        <p:txBody>
+          <a:bodyPr rtlCol="0" anchor="ctr"/>
+          <a:p>
+            <a:pPr algn="ctr"/>
+            <a:r>
+              <a:rPr lang="en-US"/>
+              <a:t>E</a:t>
+            </a:r>
+            <a:endParaRPr lang="en-US"/>
+          </a:p>
+        </p:txBody>
+      </p:sp>
+      <p:sp>
+        <p:nvSpPr>
+          <p:cNvPr id="4" name="Oval 3"/>
+          <p:cNvSpPr/>
+          <p:nvPr/>
+        </p:nvSpPr>
+        <p:spPr>
+          <a:xfrm>
+            <a:off x="4226560" y="2976245"/>
+            <a:ext cx="330835" cy="330835"/>
+          </a:xfrm>
+          <a:prstGeom prst="ellipse">
+            <a:avLst/>
+          </a:prstGeom>
+        </p:spPr>
+        <p:style>
+          <a:lnRef idx="2">
+            <a:schemeClr val="accent4">
+              <a:shade val="50000"/>
+            </a:schemeClr>
+          </a:lnRef>
+          <a:fillRef idx="1">
+            <a:schemeClr val="accent4"/>
+          </a:fillRef>
+          <a:effectRef idx="0">
+            <a:schemeClr val="accent4"/>
+          </a:effectRef>
+          <a:fontRef idx="minor">
+            <a:schemeClr val="lt1"/>
+          </a:fontRef>
+        </p:style>
+        <p:txBody>
+          <a:bodyPr rtlCol="0" anchor="ctr"/>
+          <a:p>
+            <a:pPr algn="ctr"/>
+            <a:r>
+              <a:rPr lang="en-US"/>
+              <a:t>S</a:t>
+            </a:r>
+            <a:endParaRPr lang="en-US"/>
+          </a:p>
+        </p:txBody>
+      </p:sp>
+      <p:sp>
+        <p:nvSpPr>
+          <p:cNvPr id="5" name="Oval 4"/>
+          <p:cNvSpPr/>
+          <p:nvPr/>
+        </p:nvSpPr>
+        <p:spPr>
+          <a:xfrm>
+            <a:off x="3699510" y="2760345"/>
+            <a:ext cx="330835" cy="330835"/>
+          </a:xfrm>
+          <a:prstGeom prst="ellipse">
+            <a:avLst/>
+          </a:prstGeom>
+        </p:spPr>
+        <p:style>
+          <a:lnRef idx="2">
+            <a:schemeClr val="accent4">
+              <a:shade val="50000"/>
+            </a:schemeClr>
+          </a:lnRef>
+          <a:fillRef idx="1">
+            <a:schemeClr val="accent4"/>
+          </a:fillRef>
+          <a:effectRef idx="0">
+            <a:schemeClr val="accent4"/>
+          </a:effectRef>
+          <a:fontRef idx="minor">
+            <a:schemeClr val="lt1"/>
+          </a:fontRef>
+        </p:style>
+        <p:txBody>
+          <a:bodyPr rtlCol="0" anchor="ctr"/>
+          <a:p>
+            <a:pPr algn="ctr"/>
+            <a:r>
+              <a:rPr lang="en-US"/>
+              <a:t>A</a:t>
+            </a:r>
+            <a:endParaRPr lang="en-US"/>
+          </a:p>
+        </p:txBody>
+      </p:sp>
+      <p:sp>
+        <p:nvSpPr>
+          <p:cNvPr id="7" name="Oval 6"/>
+          <p:cNvSpPr/>
+          <p:nvPr/>
+        </p:nvSpPr>
+        <p:spPr>
+          <a:xfrm>
+            <a:off x="2588260" y="2315845"/>
+            <a:ext cx="330835" cy="330835"/>
+          </a:xfrm>
+          <a:prstGeom prst="ellipse">
+            <a:avLst/>
+          </a:prstGeom>
+        </p:spPr>
+        <p:style>
+          <a:lnRef idx="2">
+            <a:schemeClr val="accent4">
+              <a:shade val="50000"/>
+            </a:schemeClr>
+          </a:lnRef>
+          <a:fillRef idx="1">
+            <a:schemeClr val="accent4"/>
+          </a:fillRef>
+          <a:effectRef idx="0">
+            <a:schemeClr val="accent4"/>
+          </a:effectRef>
+          <a:fontRef idx="minor">
+            <a:schemeClr val="lt1"/>
+          </a:fontRef>
+        </p:style>
+        <p:txBody>
+          <a:bodyPr rtlCol="0" anchor="ctr"/>
+          <a:p>
+            <a:pPr algn="ctr"/>
+            <a:r>
+              <a:rPr lang="en-US"/>
+              <a:t>B</a:t>
+            </a:r>
+            <a:endParaRPr lang="en-US"/>
+          </a:p>
+        </p:txBody>
+      </p:sp>
+      <p:sp>
+        <p:nvSpPr>
+          <p:cNvPr id="10" name="Oval 9"/>
+          <p:cNvSpPr/>
+          <p:nvPr/>
+        </p:nvSpPr>
+        <p:spPr>
+          <a:xfrm>
+            <a:off x="3204210" y="3247390"/>
+            <a:ext cx="330835" cy="330835"/>
+          </a:xfrm>
+          <a:prstGeom prst="ellipse">
+            <a:avLst/>
+          </a:prstGeom>
+        </p:spPr>
+        <p:style>
+          <a:lnRef idx="2">
+            <a:schemeClr val="accent4">
+              <a:shade val="50000"/>
+            </a:schemeClr>
+          </a:lnRef>
+          <a:fillRef idx="1">
+            <a:schemeClr val="accent4"/>
+          </a:fillRef>
+          <a:effectRef idx="0">
+            <a:schemeClr val="accent4"/>
+          </a:effectRef>
+          <a:fontRef idx="minor">
+            <a:schemeClr val="lt1"/>
+          </a:fontRef>
+        </p:style>
+        <p:txBody>
+          <a:bodyPr rtlCol="0" anchor="ctr"/>
+          <a:p>
+            <a:pPr algn="ctr"/>
+            <a:r>
+              <a:rPr lang="en-US"/>
+              <a:t>C</a:t>
+            </a:r>
+            <a:endParaRPr lang="en-US"/>
+          </a:p>
+        </p:txBody>
+      </p:sp>
+      <p:sp>
+        <p:nvSpPr>
+          <p:cNvPr id="11" name="Oval 10"/>
+          <p:cNvSpPr/>
+          <p:nvPr/>
+        </p:nvSpPr>
+        <p:spPr>
+          <a:xfrm>
+            <a:off x="3813810" y="3907790"/>
+            <a:ext cx="330835" cy="330835"/>
+          </a:xfrm>
+          <a:prstGeom prst="ellipse">
+            <a:avLst/>
+          </a:prstGeom>
+        </p:spPr>
+        <p:style>
+          <a:lnRef idx="2">
+            <a:schemeClr val="accent4">
+              <a:shade val="50000"/>
+            </a:schemeClr>
+          </a:lnRef>
+          <a:fillRef idx="1">
+            <a:schemeClr val="accent4"/>
+          </a:fillRef>
+          <a:effectRef idx="0">
+            <a:schemeClr val="accent4"/>
+          </a:effectRef>
+          <a:fontRef idx="minor">
+            <a:schemeClr val="lt1"/>
+          </a:fontRef>
+        </p:style>
+        <p:txBody>
+          <a:bodyPr rtlCol="0" anchor="ctr"/>
+          <a:p>
+            <a:pPr algn="ctr"/>
+            <a:r>
+              <a:rPr lang="en-US"/>
+              <a:t>D</a:t>
+            </a:r>
+            <a:endParaRPr lang="en-US"/>
+          </a:p>
+        </p:txBody>
+      </p:sp>
+      <p:sp>
+        <p:nvSpPr>
+          <p:cNvPr id="12" name="Oval 11"/>
+          <p:cNvSpPr/>
+          <p:nvPr/>
+        </p:nvSpPr>
+        <p:spPr>
+          <a:xfrm>
+            <a:off x="2588260" y="4009390"/>
+            <a:ext cx="330835" cy="330835"/>
+          </a:xfrm>
+          <a:prstGeom prst="ellipse">
+            <a:avLst/>
+          </a:prstGeom>
+        </p:spPr>
+        <p:style>
+          <a:lnRef idx="2">
+            <a:schemeClr val="accent4">
+              <a:shade val="50000"/>
+            </a:schemeClr>
+          </a:lnRef>
+          <a:fillRef idx="1">
+            <a:schemeClr val="accent4"/>
+          </a:fillRef>
+          <a:effectRef idx="0">
+            <a:schemeClr val="accent4"/>
+          </a:effectRef>
+          <a:fontRef idx="minor">
+            <a:schemeClr val="lt1"/>
+          </a:fontRef>
+        </p:style>
+        <p:txBody>
+          <a:bodyPr rtlCol="0" anchor="ctr"/>
+          <a:p>
+            <a:pPr algn="ctr"/>
+            <a:r>
+              <a:rPr lang="en-US"/>
+              <a:t>H</a:t>
+            </a:r>
+            <a:endParaRPr lang="en-US"/>
+          </a:p>
+        </p:txBody>
+      </p:sp>
+      <p:sp>
+        <p:nvSpPr>
+          <p:cNvPr id="13" name="Oval 12"/>
+          <p:cNvSpPr/>
+          <p:nvPr/>
+        </p:nvSpPr>
+        <p:spPr>
+          <a:xfrm>
+            <a:off x="3204210" y="3749040"/>
+            <a:ext cx="330835" cy="330835"/>
+          </a:xfrm>
+          <a:prstGeom prst="ellipse">
+            <a:avLst/>
+          </a:prstGeom>
+        </p:spPr>
+        <p:style>
+          <a:lnRef idx="2">
+            <a:schemeClr val="accent4">
+              <a:shade val="50000"/>
+            </a:schemeClr>
+          </a:lnRef>
+          <a:fillRef idx="1">
+            <a:schemeClr val="accent4"/>
+          </a:fillRef>
+          <a:effectRef idx="0">
+            <a:schemeClr val="accent4"/>
+          </a:effectRef>
+          <a:fontRef idx="minor">
+            <a:schemeClr val="lt1"/>
+          </a:fontRef>
+        </p:style>
+        <p:txBody>
+          <a:bodyPr rtlCol="0" anchor="ctr"/>
+          <a:p>
+            <a:pPr algn="ctr"/>
+            <a:r>
+              <a:rPr lang="en-US"/>
+              <a:t>F</a:t>
+            </a:r>
+            <a:endParaRPr lang="en-US"/>
+          </a:p>
+        </p:txBody>
+      </p:sp>
+      <p:sp>
+        <p:nvSpPr>
+          <p:cNvPr id="14" name="Oval 13"/>
+          <p:cNvSpPr/>
+          <p:nvPr/>
+        </p:nvSpPr>
+        <p:spPr>
+          <a:xfrm>
+            <a:off x="2531110" y="3247390"/>
+            <a:ext cx="330835" cy="330835"/>
+          </a:xfrm>
+          <a:prstGeom prst="ellipse">
+            <a:avLst/>
+          </a:prstGeom>
+        </p:spPr>
+        <p:style>
+          <a:lnRef idx="2">
+            <a:schemeClr val="accent4">
+              <a:shade val="50000"/>
+            </a:schemeClr>
+          </a:lnRef>
+          <a:fillRef idx="1">
+            <a:schemeClr val="accent4"/>
+          </a:fillRef>
+          <a:effectRef idx="0">
+            <a:schemeClr val="accent4"/>
+          </a:effectRef>
+          <a:fontRef idx="minor">
+            <a:schemeClr val="lt1"/>
+          </a:fontRef>
+        </p:style>
+        <p:txBody>
+          <a:bodyPr rtlCol="0" anchor="ctr"/>
+          <a:p>
+            <a:pPr algn="ctr"/>
+            <a:r>
+              <a:rPr lang="en-US"/>
+              <a:t>G</a:t>
+            </a:r>
+            <a:endParaRPr lang="en-US"/>
+          </a:p>
+        </p:txBody>
+      </p:sp>
+      <p:sp>
+        <p:nvSpPr>
+          <p:cNvPr id="15" name="Oval 14"/>
+          <p:cNvSpPr/>
+          <p:nvPr/>
+        </p:nvSpPr>
+        <p:spPr>
+          <a:xfrm>
+            <a:off x="1597660" y="3526790"/>
+            <a:ext cx="330835" cy="330835"/>
+          </a:xfrm>
+          <a:prstGeom prst="ellipse">
+            <a:avLst/>
+          </a:prstGeom>
+        </p:spPr>
+        <p:style>
+          <a:lnRef idx="2">
+            <a:schemeClr val="accent4">
+              <a:shade val="50000"/>
+            </a:schemeClr>
+          </a:lnRef>
+          <a:fillRef idx="1">
+            <a:schemeClr val="accent4"/>
+          </a:fillRef>
+          <a:effectRef idx="0">
+            <a:schemeClr val="accent4"/>
+          </a:effectRef>
+          <a:fontRef idx="minor">
+            <a:schemeClr val="lt1"/>
+          </a:fontRef>
+        </p:style>
+        <p:txBody>
+          <a:bodyPr rtlCol="0" anchor="ctr"/>
+          <a:p>
+            <a:pPr algn="ctr"/>
+            <a:r>
+              <a:rPr lang="en-US"/>
+              <a:t>I</a:t>
+            </a:r>
+            <a:endParaRPr lang="en-US"/>
+          </a:p>
+        </p:txBody>
+      </p:sp>
+      <p:sp>
+        <p:nvSpPr>
+          <p:cNvPr id="16" name="Oval 15"/>
+          <p:cNvSpPr/>
+          <p:nvPr/>
+        </p:nvSpPr>
+        <p:spPr>
+          <a:xfrm>
+            <a:off x="1026160" y="2561590"/>
+            <a:ext cx="330835" cy="330835"/>
+          </a:xfrm>
+          <a:prstGeom prst="ellipse">
+            <a:avLst/>
+          </a:prstGeom>
+        </p:spPr>
+        <p:style>
+          <a:lnRef idx="2">
+            <a:schemeClr val="accent4">
+              <a:shade val="50000"/>
+            </a:schemeClr>
+          </a:lnRef>
+          <a:fillRef idx="1">
+            <a:schemeClr val="accent4"/>
+          </a:fillRef>
+          <a:effectRef idx="0">
+            <a:schemeClr val="accent4"/>
+          </a:effectRef>
+          <a:fontRef idx="minor">
+            <a:schemeClr val="lt1"/>
+          </a:fontRef>
+        </p:style>
+        <p:txBody>
+          <a:bodyPr rtlCol="0" anchor="ctr"/>
+          <a:p>
+            <a:pPr algn="ctr"/>
+            <a:r>
+              <a:rPr lang="en-US"/>
+              <a:t>J</a:t>
+            </a:r>
+            <a:endParaRPr lang="en-US"/>
+          </a:p>
+        </p:txBody>
+      </p:sp>
+      <p:cxnSp>
+        <p:nvCxnSpPr>
+          <p:cNvPr id="17" name="Straight Arrow Connector 16"/>
+          <p:cNvCxnSpPr/>
+          <p:nvPr/>
+        </p:nvCxnSpPr>
+        <p:spPr>
+          <a:xfrm flipH="1" flipV="1">
+            <a:off x="4030345" y="2926080"/>
+            <a:ext cx="196215" cy="222885"/>
+          </a:xfrm>
+          <a:prstGeom prst="straightConnector1">
+            <a:avLst/>
+          </a:prstGeom>
+          <a:ln w="31750">
+            <a:solidFill>
+              <a:srgbClr val="FFC000"/>
+            </a:solidFill>
+            <a:prstDash val="sysDot"/>
+            <a:tailEnd type="arrow"/>
+          </a:ln>
+        </p:spPr>
+        <p:style>
+          <a:lnRef idx="1">
+            <a:schemeClr val="accent1"/>
+          </a:lnRef>
+          <a:fillRef idx="0">
+            <a:schemeClr val="accent1"/>
+          </a:fillRef>
+          <a:effectRef idx="0">
+            <a:schemeClr val="accent1"/>
+          </a:effectRef>
+          <a:fontRef idx="minor">
+            <a:schemeClr val="tx1"/>
+          </a:fontRef>
+        </p:style>
+      </p:cxnSp>
+      <p:cxnSp>
+        <p:nvCxnSpPr>
+          <p:cNvPr id="19" name="Straight Arrow Connector 18"/>
+          <p:cNvCxnSpPr/>
+          <p:nvPr/>
+        </p:nvCxnSpPr>
+        <p:spPr>
+          <a:xfrm flipH="1">
+            <a:off x="3486785" y="3042920"/>
+            <a:ext cx="260985" cy="252730"/>
+          </a:xfrm>
+          <a:prstGeom prst="straightConnector1">
+            <a:avLst/>
+          </a:prstGeom>
+          <a:ln w="31750">
+            <a:solidFill>
+              <a:srgbClr val="FFC000"/>
+            </a:solidFill>
+            <a:prstDash val="sysDot"/>
+            <a:tailEnd type="arrow"/>
+          </a:ln>
+        </p:spPr>
+        <p:style>
+          <a:lnRef idx="1">
+            <a:schemeClr val="accent1"/>
+          </a:lnRef>
+          <a:fillRef idx="0">
+            <a:schemeClr val="accent1"/>
+          </a:fillRef>
+          <a:effectRef idx="0">
+            <a:schemeClr val="accent1"/>
+          </a:effectRef>
+          <a:fontRef idx="minor">
+            <a:schemeClr val="tx1"/>
+          </a:fontRef>
+        </p:style>
+      </p:cxnSp>
+      <p:cxnSp>
+        <p:nvCxnSpPr>
+          <p:cNvPr id="20" name="Straight Arrow Connector 19"/>
+          <p:cNvCxnSpPr/>
+          <p:nvPr/>
+        </p:nvCxnSpPr>
+        <p:spPr>
+          <a:xfrm flipH="1" flipV="1">
+            <a:off x="2919095" y="2481580"/>
+            <a:ext cx="780415" cy="444500"/>
+          </a:xfrm>
+          <a:prstGeom prst="straightConnector1">
+            <a:avLst/>
+          </a:prstGeom>
+          <a:ln w="31750">
+            <a:solidFill>
+              <a:srgbClr val="FFC000"/>
+            </a:solidFill>
+            <a:prstDash val="sysDot"/>
+            <a:tailEnd type="arrow"/>
+          </a:ln>
+        </p:spPr>
+        <p:style>
+          <a:lnRef idx="1">
+            <a:schemeClr val="accent1"/>
+          </a:lnRef>
+          <a:fillRef idx="0">
+            <a:schemeClr val="accent1"/>
+          </a:fillRef>
+          <a:effectRef idx="0">
+            <a:schemeClr val="accent1"/>
+          </a:effectRef>
+          <a:fontRef idx="minor">
+            <a:schemeClr val="tx1"/>
+          </a:fontRef>
+        </p:style>
+      </p:cxnSp>
+      <p:cxnSp>
+        <p:nvCxnSpPr>
+          <p:cNvPr id="23" name="Straight Arrow Connector 22"/>
+          <p:cNvCxnSpPr/>
+          <p:nvPr/>
+        </p:nvCxnSpPr>
+        <p:spPr>
+          <a:xfrm flipH="1">
+            <a:off x="1356995" y="2481580"/>
+            <a:ext cx="1231265" cy="245745"/>
+          </a:xfrm>
+          <a:prstGeom prst="straightConnector1">
+            <a:avLst/>
+          </a:prstGeom>
+          <a:ln w="31750">
+            <a:solidFill>
+              <a:srgbClr val="FFC000"/>
+            </a:solidFill>
+            <a:prstDash val="sysDot"/>
+            <a:tailEnd type="arrow"/>
+          </a:ln>
+        </p:spPr>
+        <p:style>
+          <a:lnRef idx="1">
+            <a:schemeClr val="accent1"/>
+          </a:lnRef>
+          <a:fillRef idx="0">
+            <a:schemeClr val="accent1"/>
+          </a:fillRef>
+          <a:effectRef idx="0">
+            <a:schemeClr val="accent1"/>
+          </a:effectRef>
+          <a:fontRef idx="minor">
+            <a:schemeClr val="tx1"/>
+          </a:fontRef>
+        </p:style>
+      </p:cxnSp>
+      <p:cxnSp>
+        <p:nvCxnSpPr>
+          <p:cNvPr id="24" name="Straight Arrow Connector 23"/>
+          <p:cNvCxnSpPr/>
+          <p:nvPr/>
+        </p:nvCxnSpPr>
+        <p:spPr>
+          <a:xfrm flipH="1">
+            <a:off x="546735" y="2727325"/>
+            <a:ext cx="479425" cy="412115"/>
+          </a:xfrm>
+          <a:prstGeom prst="straightConnector1">
+            <a:avLst/>
+          </a:prstGeom>
+          <a:ln w="31750">
+            <a:solidFill>
+              <a:srgbClr val="FFC000"/>
+            </a:solidFill>
+            <a:prstDash val="sysDot"/>
+            <a:tailEnd type="arrow"/>
+          </a:ln>
+        </p:spPr>
+        <p:style>
+          <a:lnRef idx="1">
+            <a:schemeClr val="accent1"/>
+          </a:lnRef>
+          <a:fillRef idx="0">
+            <a:schemeClr val="accent1"/>
+          </a:fillRef>
+          <a:effectRef idx="0">
+            <a:schemeClr val="accent1"/>
+          </a:effectRef>
+          <a:fontRef idx="minor">
+            <a:schemeClr val="tx1"/>
+          </a:fontRef>
+        </p:style>
+      </p:cxnSp>
+      <p:cxnSp>
+        <p:nvCxnSpPr>
+          <p:cNvPr id="25" name="Straight Arrow Connector 24"/>
+          <p:cNvCxnSpPr/>
+          <p:nvPr/>
+        </p:nvCxnSpPr>
+        <p:spPr>
+          <a:xfrm flipH="1" flipV="1">
+            <a:off x="594995" y="3256915"/>
+            <a:ext cx="1002665" cy="435610"/>
+          </a:xfrm>
+          <a:prstGeom prst="straightConnector1">
+            <a:avLst/>
+          </a:prstGeom>
+          <a:ln w="31750">
+            <a:solidFill>
+              <a:srgbClr val="FFC000"/>
+            </a:solidFill>
+            <a:prstDash val="sysDot"/>
+            <a:tailEnd type="arrow"/>
+          </a:ln>
+        </p:spPr>
+        <p:style>
+          <a:lnRef idx="1">
+            <a:schemeClr val="accent1"/>
+          </a:lnRef>
+          <a:fillRef idx="0">
+            <a:schemeClr val="accent1"/>
+          </a:fillRef>
+          <a:effectRef idx="0">
+            <a:schemeClr val="accent1"/>
+          </a:effectRef>
+          <a:fontRef idx="minor">
+            <a:schemeClr val="tx1"/>
+          </a:fontRef>
+        </p:style>
+      </p:cxnSp>
+      <p:cxnSp>
+        <p:nvCxnSpPr>
+          <p:cNvPr id="26" name="Straight Arrow Connector 25"/>
+          <p:cNvCxnSpPr/>
+          <p:nvPr/>
+        </p:nvCxnSpPr>
+        <p:spPr>
+          <a:xfrm flipH="1" flipV="1">
+            <a:off x="1880235" y="3809365"/>
+            <a:ext cx="708025" cy="365760"/>
+          </a:xfrm>
+          <a:prstGeom prst="straightConnector1">
+            <a:avLst/>
+          </a:prstGeom>
+          <a:ln w="31750">
+            <a:solidFill>
+              <a:srgbClr val="FFC000"/>
+            </a:solidFill>
+            <a:prstDash val="sysDot"/>
+            <a:tailEnd type="arrow"/>
+          </a:ln>
+        </p:spPr>
+        <p:style>
+          <a:lnRef idx="1">
+            <a:schemeClr val="accent1"/>
+          </a:lnRef>
+          <a:fillRef idx="0">
+            <a:schemeClr val="accent1"/>
+          </a:fillRef>
+          <a:effectRef idx="0">
+            <a:schemeClr val="accent1"/>
+          </a:effectRef>
+          <a:fontRef idx="minor">
+            <a:schemeClr val="tx1"/>
+          </a:fontRef>
+        </p:style>
+      </p:cxnSp>
+      <p:cxnSp>
+        <p:nvCxnSpPr>
+          <p:cNvPr id="27" name="Straight Arrow Connector 26"/>
+          <p:cNvCxnSpPr/>
+          <p:nvPr/>
+        </p:nvCxnSpPr>
+        <p:spPr>
+          <a:xfrm flipH="1">
+            <a:off x="1880235" y="3413125"/>
+            <a:ext cx="650875" cy="161925"/>
+          </a:xfrm>
+          <a:prstGeom prst="straightConnector1">
+            <a:avLst/>
+          </a:prstGeom>
+          <a:ln w="31750">
+            <a:solidFill>
+              <a:srgbClr val="FFC000"/>
+            </a:solidFill>
+            <a:prstDash val="sysDot"/>
+            <a:tailEnd type="arrow"/>
+          </a:ln>
+        </p:spPr>
+        <p:style>
+          <a:lnRef idx="1">
+            <a:schemeClr val="accent1"/>
+          </a:lnRef>
+          <a:fillRef idx="0">
+            <a:schemeClr val="accent1"/>
+          </a:fillRef>
+          <a:effectRef idx="0">
+            <a:schemeClr val="accent1"/>
+          </a:effectRef>
+          <a:fontRef idx="minor">
+            <a:schemeClr val="tx1"/>
+          </a:fontRef>
+        </p:style>
+      </p:cxnSp>
+      <p:cxnSp>
+        <p:nvCxnSpPr>
+          <p:cNvPr id="28" name="Straight Arrow Connector 27"/>
+          <p:cNvCxnSpPr/>
+          <p:nvPr/>
+        </p:nvCxnSpPr>
+        <p:spPr>
+          <a:xfrm flipH="1">
+            <a:off x="2861945" y="3413125"/>
+            <a:ext cx="342265" cy="0"/>
+          </a:xfrm>
+          <a:prstGeom prst="straightConnector1">
+            <a:avLst/>
+          </a:prstGeom>
+          <a:ln w="31750">
+            <a:solidFill>
+              <a:srgbClr val="FFC000"/>
+            </a:solidFill>
+            <a:prstDash val="sysDot"/>
+            <a:tailEnd type="arrow"/>
+          </a:ln>
+        </p:spPr>
+        <p:style>
+          <a:lnRef idx="1">
+            <a:schemeClr val="accent1"/>
+          </a:lnRef>
+          <a:fillRef idx="0">
+            <a:schemeClr val="accent1"/>
+          </a:fillRef>
+          <a:effectRef idx="0">
+            <a:schemeClr val="accent1"/>
+          </a:effectRef>
+          <a:fontRef idx="minor">
+            <a:schemeClr val="tx1"/>
+          </a:fontRef>
+        </p:style>
+      </p:cxnSp>
+      <p:cxnSp>
+        <p:nvCxnSpPr>
+          <p:cNvPr id="29" name="Straight Arrow Connector 28"/>
+          <p:cNvCxnSpPr/>
+          <p:nvPr/>
+        </p:nvCxnSpPr>
+        <p:spPr>
+          <a:xfrm flipH="1">
+            <a:off x="2919095" y="3914775"/>
+            <a:ext cx="285115" cy="260350"/>
+          </a:xfrm>
+          <a:prstGeom prst="straightConnector1">
+            <a:avLst/>
+          </a:prstGeom>
+          <a:ln w="31750">
+            <a:solidFill>
+              <a:srgbClr val="FFC000"/>
+            </a:solidFill>
+            <a:prstDash val="sysDot"/>
+            <a:tailEnd type="arrow"/>
+          </a:ln>
+        </p:spPr>
+        <p:style>
+          <a:lnRef idx="1">
+            <a:schemeClr val="accent1"/>
+          </a:lnRef>
+          <a:fillRef idx="0">
+            <a:schemeClr val="accent1"/>
+          </a:fillRef>
+          <a:effectRef idx="0">
+            <a:schemeClr val="accent1"/>
+          </a:effectRef>
+          <a:fontRef idx="minor">
+            <a:schemeClr val="tx1"/>
+          </a:fontRef>
+        </p:style>
+      </p:cxnSp>
+      <p:cxnSp>
+        <p:nvCxnSpPr>
+          <p:cNvPr id="30" name="Straight Arrow Connector 29"/>
+          <p:cNvCxnSpPr/>
+          <p:nvPr/>
+        </p:nvCxnSpPr>
+        <p:spPr>
+          <a:xfrm flipH="1" flipV="1">
+            <a:off x="3559810" y="3888740"/>
+            <a:ext cx="254000" cy="184785"/>
+          </a:xfrm>
+          <a:prstGeom prst="straightConnector1">
+            <a:avLst/>
+          </a:prstGeom>
+          <a:ln w="31750">
+            <a:solidFill>
+              <a:srgbClr val="FFC000"/>
+            </a:solidFill>
+            <a:prstDash val="sysDot"/>
+            <a:tailEnd type="arrow"/>
+          </a:ln>
+        </p:spPr>
+        <p:style>
+          <a:lnRef idx="1">
+            <a:schemeClr val="accent1"/>
+          </a:lnRef>
+          <a:fillRef idx="0">
+            <a:schemeClr val="accent1"/>
+          </a:fillRef>
+          <a:effectRef idx="0">
+            <a:schemeClr val="accent1"/>
+          </a:effectRef>
+          <a:fontRef idx="minor">
+            <a:schemeClr val="tx1"/>
+          </a:fontRef>
+        </p:style>
+      </p:cxnSp>
+      <p:cxnSp>
+        <p:nvCxnSpPr>
+          <p:cNvPr id="31" name="Straight Arrow Connector 30"/>
+          <p:cNvCxnSpPr>
+            <a:stCxn id="4" idx="4"/>
+            <a:endCxn id="11" idx="7"/>
+          </p:cNvCxnSpPr>
+          <p:nvPr/>
+        </p:nvCxnSpPr>
+        <p:spPr>
+          <a:xfrm flipH="1">
+            <a:off x="4096385" y="3307080"/>
+            <a:ext cx="295910" cy="648970"/>
+          </a:xfrm>
+          <a:prstGeom prst="straightConnector1">
+            <a:avLst/>
+          </a:prstGeom>
+          <a:ln w="31750">
+            <a:solidFill>
+              <a:srgbClr val="FFC000"/>
+            </a:solidFill>
+            <a:prstDash val="sysDot"/>
+            <a:tailEnd type="arrow"/>
+          </a:ln>
+        </p:spPr>
+        <p:style>
+          <a:lnRef idx="1">
+            <a:schemeClr val="accent1"/>
+          </a:lnRef>
+          <a:fillRef idx="0">
+            <a:schemeClr val="accent1"/>
+          </a:fillRef>
+          <a:effectRef idx="0">
+            <a:schemeClr val="accent1"/>
+          </a:effectRef>
+          <a:fontRef idx="minor">
+            <a:schemeClr val="tx1"/>
+          </a:fontRef>
+        </p:style>
+      </p:cxnSp>
+      <p:sp>
+        <p:nvSpPr>
+          <p:cNvPr id="6" name="Left Bracket 5"/>
+          <p:cNvSpPr/>
+          <p:nvPr/>
+        </p:nvSpPr>
+        <p:spPr>
+          <a:xfrm>
+            <a:off x="9380855" y="1892300"/>
+            <a:ext cx="914400" cy="2345690"/>
+          </a:xfrm>
+          <a:prstGeom prst="leftBracket">
+            <a:avLst/>
+          </a:prstGeom>
+          <a:ln w="47625"/>
+        </p:spPr>
+        <p:style>
+          <a:lnRef idx="3">
+            <a:schemeClr val="accent4"/>
+          </a:lnRef>
+          <a:fillRef idx="0">
+            <a:schemeClr val="accent4"/>
+          </a:fillRef>
+          <a:effectRef idx="2">
+            <a:schemeClr val="accent4"/>
+          </a:effectRef>
+          <a:fontRef idx="minor">
+            <a:schemeClr val="tx1"/>
+          </a:fontRef>
+        </p:style>
+        <p:txBody>
+          <a:bodyPr rtlCol="0" anchor="ctr"/>
+          <a:p>
+            <a:pPr algn="ctr"/>
+            <a:endParaRPr lang="en-US"/>
+          </a:p>
+        </p:txBody>
+      </p:sp>
+      <p:sp>
+        <p:nvSpPr>
+          <p:cNvPr id="8" name="Rounded Rectangle 7"/>
+          <p:cNvSpPr/>
+          <p:nvPr/>
+        </p:nvSpPr>
+        <p:spPr>
+          <a:xfrm>
+            <a:off x="9380855" y="1294765"/>
+            <a:ext cx="1996440" cy="506730"/>
+          </a:xfrm>
+          <a:prstGeom prst="roundRect">
+            <a:avLst/>
+          </a:prstGeom>
+          <a:solidFill>
+            <a:srgbClr val="FFC000"/>
+          </a:solidFill>
+          <a:ln>
+            <a:solidFill>
+              <a:srgbClr val="FFC000"/>
+            </a:solidFill>
+          </a:ln>
+        </p:spPr>
+        <p:style>
+          <a:lnRef idx="2">
+            <a:schemeClr val="accent1">
+              <a:shade val="50000"/>
+            </a:schemeClr>
+          </a:lnRef>
+          <a:fillRef idx="1">
+            <a:schemeClr val="accent1"/>
+          </a:fillRef>
+          <a:effectRef idx="0">
+            <a:schemeClr val="accent1"/>
+          </a:effectRef>
+          <a:fontRef idx="minor">
+            <a:schemeClr val="lt1"/>
+          </a:fontRef>
+        </p:style>
+        <p:txBody>
+          <a:bodyPr rtlCol="0" anchor="ctr"/>
+          <a:p>
+            <a:pPr algn="ctr"/>
+            <a:r>
+              <a:rPr lang="en-US"/>
+              <a:t>City</a:t>
+            </a:r>
+            <a:endParaRPr lang="en-US"/>
+          </a:p>
+        </p:txBody>
+      </p:sp>
+      <p:sp>
+        <p:nvSpPr>
+          <p:cNvPr id="9" name="Rounded Rectangle 8"/>
+          <p:cNvSpPr/>
+          <p:nvPr/>
+        </p:nvSpPr>
+        <p:spPr>
+          <a:xfrm>
+            <a:off x="9625965" y="2147570"/>
+            <a:ext cx="1996440" cy="506730"/>
+          </a:xfrm>
+          <a:prstGeom prst="roundRect">
+            <a:avLst/>
+          </a:prstGeom>
+          <a:solidFill>
+            <a:srgbClr val="FFC000"/>
+          </a:solidFill>
+          <a:ln>
+            <a:solidFill>
+              <a:srgbClr val="FFC000"/>
+            </a:solidFill>
+          </a:ln>
+        </p:spPr>
+        <p:style>
+          <a:lnRef idx="2">
+            <a:schemeClr val="accent1">
+              <a:shade val="50000"/>
+            </a:schemeClr>
+          </a:lnRef>
+          <a:fillRef idx="1">
+            <a:schemeClr val="accent1"/>
+          </a:fillRef>
+          <a:effectRef idx="0">
+            <a:schemeClr val="accent1"/>
+          </a:effectRef>
+          <a:fontRef idx="minor">
+            <a:schemeClr val="lt1"/>
+          </a:fontRef>
+        </p:style>
+        <p:txBody>
+          <a:bodyPr rtlCol="0" anchor="ctr"/>
+          <a:p>
+            <a:pPr algn="ctr"/>
+            <a:r>
+              <a:rPr lang="en-US"/>
+              <a:t>Name: String</a:t>
+            </a:r>
+            <a:endParaRPr lang="en-US"/>
+          </a:p>
+        </p:txBody>
+      </p:sp>
+      <p:sp>
+        <p:nvSpPr>
+          <p:cNvPr id="18" name="Rounded Rectangle 17"/>
+          <p:cNvSpPr/>
+          <p:nvPr/>
+        </p:nvSpPr>
+        <p:spPr>
+          <a:xfrm>
+            <a:off x="9545320" y="3482975"/>
+            <a:ext cx="2158365" cy="506730"/>
+          </a:xfrm>
+          <a:prstGeom prst="roundRect">
+            <a:avLst/>
+          </a:prstGeom>
+          <a:solidFill>
+            <a:srgbClr val="FFC000"/>
+          </a:solidFill>
+          <a:ln>
+            <a:solidFill>
+              <a:srgbClr val="FFC000"/>
+            </a:solidFill>
+          </a:ln>
+        </p:spPr>
+        <p:style>
+          <a:lnRef idx="2">
+            <a:schemeClr val="accent1">
+              <a:shade val="50000"/>
+            </a:schemeClr>
+          </a:lnRef>
+          <a:fillRef idx="1">
+            <a:schemeClr val="accent1"/>
+          </a:fillRef>
+          <a:effectRef idx="0">
+            <a:schemeClr val="accent1"/>
+          </a:effectRef>
+          <a:fontRef idx="minor">
+            <a:schemeClr val="lt1"/>
+          </a:fontRef>
+        </p:style>
+        <p:txBody>
+          <a:bodyPr rtlCol="0" anchor="ctr"/>
+          <a:p>
+            <a:pPr algn="ctr"/>
+            <a:r>
+              <a:rPr lang="en-US"/>
+              <a:t>Neighbours: [Path]</a:t>
+            </a:r>
+            <a:endParaRPr lang="en-US"/>
+          </a:p>
+        </p:txBody>
+      </p:sp>
+      <p:sp>
+        <p:nvSpPr>
+          <p:cNvPr id="21" name="Left Bracket 20"/>
+          <p:cNvSpPr/>
+          <p:nvPr/>
+        </p:nvSpPr>
+        <p:spPr>
+          <a:xfrm>
+            <a:off x="6137275" y="1892300"/>
+            <a:ext cx="914400" cy="2322830"/>
+          </a:xfrm>
+          <a:prstGeom prst="leftBracket">
+            <a:avLst/>
+          </a:prstGeom>
+          <a:ln w="47625"/>
+        </p:spPr>
+        <p:style>
+          <a:lnRef idx="3">
+            <a:schemeClr val="accent4"/>
+          </a:lnRef>
+          <a:fillRef idx="0">
+            <a:schemeClr val="accent4"/>
+          </a:fillRef>
+          <a:effectRef idx="2">
+            <a:schemeClr val="accent4"/>
+          </a:effectRef>
+          <a:fontRef idx="minor">
+            <a:schemeClr val="tx1"/>
+          </a:fontRef>
+        </p:style>
+        <p:txBody>
+          <a:bodyPr rtlCol="0" anchor="ctr"/>
+          <a:p>
+            <a:pPr algn="ctr"/>
+            <a:endParaRPr lang="en-US"/>
+          </a:p>
+        </p:txBody>
+      </p:sp>
+      <p:sp>
+        <p:nvSpPr>
+          <p:cNvPr id="22" name="Rounded Rectangle 21"/>
+          <p:cNvSpPr/>
+          <p:nvPr/>
+        </p:nvSpPr>
+        <p:spPr>
+          <a:xfrm>
+            <a:off x="6137275" y="1294765"/>
+            <a:ext cx="1996440" cy="506730"/>
+          </a:xfrm>
+          <a:prstGeom prst="roundRect">
+            <a:avLst/>
+          </a:prstGeom>
+          <a:solidFill>
+            <a:srgbClr val="FFC000"/>
+          </a:solidFill>
+          <a:ln>
+            <a:solidFill>
+              <a:srgbClr val="FFC000"/>
+            </a:solidFill>
+          </a:ln>
+        </p:spPr>
+        <p:style>
+          <a:lnRef idx="2">
+            <a:schemeClr val="accent1">
+              <a:shade val="50000"/>
+            </a:schemeClr>
+          </a:lnRef>
+          <a:fillRef idx="1">
+            <a:schemeClr val="accent1"/>
+          </a:fillRef>
+          <a:effectRef idx="0">
+            <a:schemeClr val="accent1"/>
+          </a:effectRef>
+          <a:fontRef idx="minor">
+            <a:schemeClr val="lt1"/>
+          </a:fontRef>
+        </p:style>
+        <p:txBody>
+          <a:bodyPr rtlCol="0" anchor="ctr"/>
+          <a:p>
+            <a:pPr algn="ctr"/>
+            <a:r>
+              <a:rPr lang="en-US"/>
+              <a:t>Path</a:t>
+            </a:r>
+            <a:endParaRPr lang="en-US"/>
+          </a:p>
+        </p:txBody>
+      </p:sp>
+      <p:sp>
+        <p:nvSpPr>
+          <p:cNvPr id="32" name="Rounded Rectangle 31"/>
+          <p:cNvSpPr/>
+          <p:nvPr/>
+        </p:nvSpPr>
+        <p:spPr>
+          <a:xfrm>
+            <a:off x="6309360" y="2179955"/>
+            <a:ext cx="1996440" cy="506730"/>
+          </a:xfrm>
+          <a:prstGeom prst="roundRect">
+            <a:avLst/>
+          </a:prstGeom>
+          <a:solidFill>
+            <a:srgbClr val="FFC000"/>
+          </a:solidFill>
+          <a:ln>
+            <a:solidFill>
+              <a:srgbClr val="FFC000"/>
+            </a:solidFill>
+          </a:ln>
+        </p:spPr>
+        <p:style>
+          <a:lnRef idx="2">
+            <a:schemeClr val="accent1">
+              <a:shade val="50000"/>
+            </a:schemeClr>
+          </a:lnRef>
+          <a:fillRef idx="1">
+            <a:schemeClr val="accent1"/>
+          </a:fillRef>
+          <a:effectRef idx="0">
+            <a:schemeClr val="accent1"/>
+          </a:effectRef>
+          <a:fontRef idx="minor">
+            <a:schemeClr val="lt1"/>
+          </a:fontRef>
+        </p:style>
+        <p:txBody>
+          <a:bodyPr rtlCol="0" anchor="ctr"/>
+          <a:p>
+            <a:pPr algn="ctr"/>
+            <a:r>
+              <a:rPr lang="en-US"/>
+              <a:t>From: String</a:t>
+            </a:r>
+            <a:endParaRPr lang="en-US"/>
+          </a:p>
+        </p:txBody>
+      </p:sp>
+      <p:sp>
+        <p:nvSpPr>
+          <p:cNvPr id="33" name="Rounded Rectangle 32"/>
+          <p:cNvSpPr/>
+          <p:nvPr/>
+        </p:nvSpPr>
+        <p:spPr>
+          <a:xfrm>
+            <a:off x="6309360" y="3482975"/>
+            <a:ext cx="1996440" cy="506730"/>
+          </a:xfrm>
+          <a:prstGeom prst="roundRect">
+            <a:avLst/>
+          </a:prstGeom>
+          <a:solidFill>
+            <a:srgbClr val="FFC000"/>
+          </a:solidFill>
+          <a:ln>
+            <a:solidFill>
+              <a:srgbClr val="FFC000"/>
+            </a:solidFill>
+          </a:ln>
+        </p:spPr>
+        <p:style>
+          <a:lnRef idx="2">
+            <a:schemeClr val="accent1">
+              <a:shade val="50000"/>
+            </a:schemeClr>
+          </a:lnRef>
+          <a:fillRef idx="1">
+            <a:schemeClr val="accent1"/>
+          </a:fillRef>
+          <a:effectRef idx="0">
+            <a:schemeClr val="accent1"/>
+          </a:effectRef>
+          <a:fontRef idx="minor">
+            <a:schemeClr val="lt1"/>
+          </a:fontRef>
+        </p:style>
+        <p:txBody>
+          <a:bodyPr rtlCol="0" anchor="ctr"/>
+          <a:p>
+            <a:pPr algn="ctr"/>
+            <a:r>
+              <a:rPr lang="en-US"/>
+              <a:t>Cost</a:t>
+            </a:r>
+            <a:endParaRPr lang="en-US"/>
+          </a:p>
+        </p:txBody>
+      </p:sp>
+      <p:sp>
+        <p:nvSpPr>
+          <p:cNvPr id="34" name="Rounded Rectangle 33"/>
+          <p:cNvSpPr/>
+          <p:nvPr/>
+        </p:nvSpPr>
+        <p:spPr>
+          <a:xfrm>
+            <a:off x="6309360" y="2800350"/>
+            <a:ext cx="1996440" cy="506730"/>
+          </a:xfrm>
+          <a:prstGeom prst="roundRect">
+            <a:avLst/>
+          </a:prstGeom>
+          <a:solidFill>
+            <a:srgbClr val="FFC000"/>
+          </a:solidFill>
+          <a:ln>
+            <a:solidFill>
+              <a:srgbClr val="FFC000"/>
+            </a:solidFill>
+          </a:ln>
+        </p:spPr>
+        <p:style>
+          <a:lnRef idx="2">
+            <a:schemeClr val="accent1">
+              <a:shade val="50000"/>
+            </a:schemeClr>
+          </a:lnRef>
+          <a:fillRef idx="1">
+            <a:schemeClr val="accent1"/>
+          </a:fillRef>
+          <a:effectRef idx="0">
+            <a:schemeClr val="accent1"/>
+          </a:effectRef>
+          <a:fontRef idx="minor">
+            <a:schemeClr val="lt1"/>
+          </a:fontRef>
+        </p:style>
+        <p:txBody>
+          <a:bodyPr rtlCol="0" anchor="ctr"/>
+          <a:p>
+            <a:pPr algn="ctr"/>
+            <a:r>
+              <a:rPr lang="en-US"/>
+              <a:t>To: String</a:t>
+            </a:r>
+            <a:endParaRPr lang="en-US"/>
+          </a:p>
+        </p:txBody>
+      </p:sp>
+      <p:sp>
+        <p:nvSpPr>
+          <p:cNvPr id="35" name="Rounded Rectangle 34"/>
+          <p:cNvSpPr/>
+          <p:nvPr/>
+        </p:nvSpPr>
+        <p:spPr>
+          <a:xfrm>
+            <a:off x="9625965" y="2811780"/>
+            <a:ext cx="2158365" cy="506730"/>
+          </a:xfrm>
+          <a:prstGeom prst="roundRect">
+            <a:avLst/>
+          </a:prstGeom>
+          <a:solidFill>
+            <a:srgbClr val="FFC000"/>
+          </a:solidFill>
+          <a:ln>
+            <a:solidFill>
+              <a:srgbClr val="FFC000"/>
+            </a:solidFill>
+          </a:ln>
+        </p:spPr>
+        <p:style>
+          <a:lnRef idx="2">
+            <a:schemeClr val="accent1">
+              <a:shade val="50000"/>
+            </a:schemeClr>
+          </a:lnRef>
+          <a:fillRef idx="1">
+            <a:schemeClr val="accent1"/>
+          </a:fillRef>
+          <a:effectRef idx="0">
+            <a:schemeClr val="accent1"/>
+          </a:effectRef>
+          <a:fontRef idx="minor">
+            <a:schemeClr val="lt1"/>
+          </a:fontRef>
+        </p:style>
+        <p:txBody>
+          <a:bodyPr rtlCol="0" anchor="ctr"/>
+          <a:p>
+            <a:pPr algn="ctr"/>
+            <a:r>
+              <a:rPr lang="en-US"/>
+              <a:t>Smallest Cost: int</a:t>
+            </a:r>
+            <a:endParaRPr lang="en-US"/>
+          </a:p>
+        </p:txBody>
+      </p:sp>
+    </p:spTree>
+  </p:cSld>
+  <p:clrMapOvr>
+    <a:masterClrMapping/>
+  </p:clrMapOvr>
+  <mc:AlternateContent xmlns:mc="http://schemas.openxmlformats.org/markup-compatibility/2006" xmlns:p159="http://schemas.microsoft.com/office/powerpoint/2015/09/main">
+    <mc:Choice Requires="p159">
+      <p:transition xmlns:p14="http://schemas.microsoft.com/office/powerpoint/2010/main" spd="slow" p14:dur="1000">
+        <p159:morph option="byObject"/>
+      </p:transition>
+    </mc:Choice>
+    <mc:Fallback>
+      <p:transition spd="slow">
+        <p:fade/>
+      </p:transition>
+    </mc:Fallback>
+  </mc:AlternateContent>
 </p:sld>
 </file>
 

</xml_diff>